<commit_message>
update on the post by id
</commit_message>
<xml_diff>
--- a/Club_fusion_ppt.pptx
+++ b/Club_fusion_ppt.pptx
@@ -5,7 +5,7 @@
     <p:sldMasterId id="2147483659" r:id="rId1"/>
   </p:sldMasterIdLst>
   <p:notesMasterIdLst>
-    <p:notesMasterId r:id="rId14"/>
+    <p:notesMasterId r:id="rId23"/>
   </p:notesMasterIdLst>
   <p:sldIdLst>
     <p:sldId id="256" r:id="rId2"/>
@@ -17,16 +17,25 @@
     <p:sldId id="266" r:id="rId8"/>
     <p:sldId id="267" r:id="rId9"/>
     <p:sldId id="280" r:id="rId10"/>
-    <p:sldId id="279" r:id="rId11"/>
-    <p:sldId id="282" r:id="rId12"/>
-    <p:sldId id="281" r:id="rId13"/>
+    <p:sldId id="283" r:id="rId11"/>
+    <p:sldId id="284" r:id="rId12"/>
+    <p:sldId id="285" r:id="rId13"/>
+    <p:sldId id="286" r:id="rId14"/>
+    <p:sldId id="287" r:id="rId15"/>
+    <p:sldId id="288" r:id="rId16"/>
+    <p:sldId id="289" r:id="rId17"/>
+    <p:sldId id="291" r:id="rId18"/>
+    <p:sldId id="290" r:id="rId19"/>
+    <p:sldId id="279" r:id="rId20"/>
+    <p:sldId id="282" r:id="rId21"/>
+    <p:sldId id="281" r:id="rId22"/>
   </p:sldIdLst>
   <p:sldSz cx="12192000" cy="6858000"/>
   <p:notesSz cx="6858000" cy="9144000"/>
   <p:embeddedFontLst>
     <p:embeddedFont>
       <p:font typeface="Algerian" panose="04020705040A02060702" pitchFamily="82" charset="0"/>
-      <p:regular r:id="rId15"/>
+      <p:regular r:id="rId24"/>
     </p:embeddedFont>
   </p:embeddedFontLst>
   <p:defaultTextStyle>
@@ -827,7 +836,7 @@
   <p:cSld>
     <p:spTree>
       <p:nvGrpSpPr>
-        <p:cNvPr id="1" name="Shape 248"/>
+        <p:cNvPr id="1" name="Shape 255"/>
         <p:cNvGrpSpPr/>
         <p:nvPr/>
       </p:nvGrpSpPr>
@@ -841,7 +850,7 @@
       </p:grpSpPr>
       <p:sp>
         <p:nvSpPr>
-          <p:cNvPr id="249" name="Google Shape;249;g2a6e7a28048_0_138:notes"/>
+          <p:cNvPr id="256" name="Google Shape;256;g2a6e7a28048_0_144:notes"/>
           <p:cNvSpPr txBox="1">
             <a:spLocks noGrp="1"/>
           </p:cNvSpPr>
@@ -879,129 +888,7 @@
       </p:sp>
       <p:sp>
         <p:nvSpPr>
-          <p:cNvPr id="250" name="Google Shape;250;g2a6e7a28048_0_138:notes"/>
-          <p:cNvSpPr>
-            <a:spLocks noGrp="1" noRot="1" noChangeAspect="1"/>
-          </p:cNvSpPr>
-          <p:nvPr>
-            <p:ph type="sldImg" idx="2"/>
-          </p:nvPr>
-        </p:nvSpPr>
-        <p:spPr>
-          <a:xfrm>
-            <a:off x="381000" y="685800"/>
-            <a:ext cx="6096000" cy="3429000"/>
-          </a:xfrm>
-          <a:custGeom>
-            <a:avLst/>
-            <a:gdLst/>
-            <a:ahLst/>
-            <a:cxnLst/>
-            <a:rect l="l" t="t" r="r" b="b"/>
-            <a:pathLst>
-              <a:path w="120000" h="120000" extrusionOk="0">
-                <a:moveTo>
-                  <a:pt x="0" y="0"/>
-                </a:moveTo>
-                <a:lnTo>
-                  <a:pt x="120000" y="0"/>
-                </a:lnTo>
-                <a:lnTo>
-                  <a:pt x="120000" y="120000"/>
-                </a:lnTo>
-                <a:lnTo>
-                  <a:pt x="0" y="120000"/>
-                </a:lnTo>
-                <a:close/>
-              </a:path>
-            </a:pathLst>
-          </a:custGeom>
-        </p:spPr>
-      </p:sp>
-    </p:spTree>
-  </p:cSld>
-  <p:clrMapOvr>
-    <a:masterClrMapping/>
-  </p:clrMapOvr>
-</p:notes>
-</file>
-
-<file path=ppt/notesSlides/notesSlide11.xml><?xml version="1.0" encoding="utf-8"?>
-<p:notes xmlns:a="http://schemas.openxmlformats.org/drawingml/2006/main" xmlns:r="http://schemas.openxmlformats.org/officeDocument/2006/relationships" xmlns:p="http://schemas.openxmlformats.org/presentationml/2006/main" showMasterSp="0" showMasterPhAnim="0">
-  <p:cSld>
-    <p:spTree>
-      <p:nvGrpSpPr>
-        <p:cNvPr id="1" name="Shape 255">
-          <a:extLst>
-            <a:ext uri="{FF2B5EF4-FFF2-40B4-BE49-F238E27FC236}">
-              <a16:creationId xmlns:a16="http://schemas.microsoft.com/office/drawing/2014/main" id="{E9051A17-C5E5-C51C-72D0-4780761D06AF}"/>
-            </a:ext>
-          </a:extLst>
-        </p:cNvPr>
-        <p:cNvGrpSpPr/>
-        <p:nvPr/>
-      </p:nvGrpSpPr>
-      <p:grpSpPr>
-        <a:xfrm>
-          <a:off x="0" y="0"/>
-          <a:ext cx="0" cy="0"/>
-          <a:chOff x="0" y="0"/>
-          <a:chExt cx="0" cy="0"/>
-        </a:xfrm>
-      </p:grpSpPr>
-      <p:sp>
-        <p:nvSpPr>
-          <p:cNvPr id="256" name="Google Shape;256;g2a6e7a28048_0_144:notes">
-            <a:extLst>
-              <a:ext uri="{FF2B5EF4-FFF2-40B4-BE49-F238E27FC236}">
-                <a16:creationId xmlns:a16="http://schemas.microsoft.com/office/drawing/2014/main" id="{9A3FD228-A60C-CC52-4D12-489F9033448B}"/>
-              </a:ext>
-            </a:extLst>
-          </p:cNvPr>
-          <p:cNvSpPr txBox="1">
-            <a:spLocks noGrp="1"/>
-          </p:cNvSpPr>
-          <p:nvPr>
-            <p:ph type="body" idx="1"/>
-          </p:nvPr>
-        </p:nvSpPr>
-        <p:spPr>
-          <a:xfrm>
-            <a:off x="685800" y="4343400"/>
-            <a:ext cx="5486400" cy="4114800"/>
-          </a:xfrm>
-          <a:prstGeom prst="rect">
-            <a:avLst/>
-          </a:prstGeom>
-        </p:spPr>
-        <p:txBody>
-          <a:bodyPr spcFirstLastPara="1" wrap="square" lIns="91425" tIns="91425" rIns="91425" bIns="91425" anchor="t" anchorCtr="0">
-            <a:noAutofit/>
-          </a:bodyPr>
-          <a:lstStyle/>
-          <a:p>
-            <a:pPr marL="0" lvl="0" indent="0" algn="l" rtl="0">
-              <a:spcBef>
-                <a:spcPts val="0"/>
-              </a:spcBef>
-              <a:spcAft>
-                <a:spcPts val="0"/>
-              </a:spcAft>
-              <a:buNone/>
-            </a:pPr>
-            <a:endParaRPr/>
-          </a:p>
-        </p:txBody>
-      </p:sp>
-      <p:sp>
-        <p:nvSpPr>
-          <p:cNvPr id="257" name="Google Shape;257;g2a6e7a28048_0_144:notes">
-            <a:extLst>
-              <a:ext uri="{FF2B5EF4-FFF2-40B4-BE49-F238E27FC236}">
-                <a16:creationId xmlns:a16="http://schemas.microsoft.com/office/drawing/2014/main" id="{72617834-EDCB-8961-3680-72701AC0F2D3}"/>
-              </a:ext>
-            </a:extLst>
-          </p:cNvPr>
+          <p:cNvPr id="257" name="Google Shape;257;g2a6e7a28048_0_144:notes"/>
           <p:cNvSpPr>
             <a:spLocks noGrp="1" noRot="1" noChangeAspect="1"/>
           </p:cNvSpPr>
@@ -1043,7 +930,7 @@
     </p:spTree>
     <p:extLst>
       <p:ext uri="{BB962C8B-B14F-4D97-AF65-F5344CB8AC3E}">
-        <p14:creationId xmlns:p14="http://schemas.microsoft.com/office/powerpoint/2010/main" val="3638223030"/>
+        <p14:creationId xmlns:p14="http://schemas.microsoft.com/office/powerpoint/2010/main" val="1265649385"/>
       </p:ext>
     </p:extLst>
   </p:cSld>
@@ -1053,12 +940,12 @@
 </p:notes>
 </file>
 
-<file path=ppt/notesSlides/notesSlide12.xml><?xml version="1.0" encoding="utf-8"?>
+<file path=ppt/notesSlides/notesSlide11.xml><?xml version="1.0" encoding="utf-8"?>
 <p:notes xmlns:a="http://schemas.openxmlformats.org/drawingml/2006/main" xmlns:r="http://schemas.openxmlformats.org/officeDocument/2006/relationships" xmlns:p="http://schemas.openxmlformats.org/presentationml/2006/main" showMasterSp="0" showMasterPhAnim="0">
   <p:cSld>
     <p:spTree>
       <p:nvGrpSpPr>
-        <p:cNvPr id="1" name="Shape 262"/>
+        <p:cNvPr id="1" name="Shape 255"/>
         <p:cNvGrpSpPr/>
         <p:nvPr/>
       </p:nvGrpSpPr>
@@ -1072,7 +959,7 @@
       </p:grpSpPr>
       <p:sp>
         <p:nvSpPr>
-          <p:cNvPr id="263" name="Google Shape;263;g25e574a55c6_3_317:notes"/>
+          <p:cNvPr id="256" name="Google Shape;256;g2a6e7a28048_0_144:notes"/>
           <p:cNvSpPr txBox="1">
             <a:spLocks noGrp="1"/>
           </p:cNvSpPr>
@@ -1110,7 +997,879 @@
       </p:sp>
       <p:sp>
         <p:nvSpPr>
-          <p:cNvPr id="264" name="Google Shape;264;g25e574a55c6_3_317:notes"/>
+          <p:cNvPr id="257" name="Google Shape;257;g2a6e7a28048_0_144:notes"/>
+          <p:cNvSpPr>
+            <a:spLocks noGrp="1" noRot="1" noChangeAspect="1"/>
+          </p:cNvSpPr>
+          <p:nvPr>
+            <p:ph type="sldImg" idx="2"/>
+          </p:nvPr>
+        </p:nvSpPr>
+        <p:spPr>
+          <a:xfrm>
+            <a:off x="381000" y="685800"/>
+            <a:ext cx="6096000" cy="3429000"/>
+          </a:xfrm>
+          <a:custGeom>
+            <a:avLst/>
+            <a:gdLst/>
+            <a:ahLst/>
+            <a:cxnLst/>
+            <a:rect l="l" t="t" r="r" b="b"/>
+            <a:pathLst>
+              <a:path w="120000" h="120000" extrusionOk="0">
+                <a:moveTo>
+                  <a:pt x="0" y="0"/>
+                </a:moveTo>
+                <a:lnTo>
+                  <a:pt x="120000" y="0"/>
+                </a:lnTo>
+                <a:lnTo>
+                  <a:pt x="120000" y="120000"/>
+                </a:lnTo>
+                <a:lnTo>
+                  <a:pt x="0" y="120000"/>
+                </a:lnTo>
+                <a:close/>
+              </a:path>
+            </a:pathLst>
+          </a:custGeom>
+        </p:spPr>
+      </p:sp>
+    </p:spTree>
+    <p:extLst>
+      <p:ext uri="{BB962C8B-B14F-4D97-AF65-F5344CB8AC3E}">
+        <p14:creationId xmlns:p14="http://schemas.microsoft.com/office/powerpoint/2010/main" val="175030638"/>
+      </p:ext>
+    </p:extLst>
+  </p:cSld>
+  <p:clrMapOvr>
+    <a:masterClrMapping/>
+  </p:clrMapOvr>
+</p:notes>
+</file>
+
+<file path=ppt/notesSlides/notesSlide12.xml><?xml version="1.0" encoding="utf-8"?>
+<p:notes xmlns:a="http://schemas.openxmlformats.org/drawingml/2006/main" xmlns:r="http://schemas.openxmlformats.org/officeDocument/2006/relationships" xmlns:p="http://schemas.openxmlformats.org/presentationml/2006/main" showMasterSp="0" showMasterPhAnim="0">
+  <p:cSld>
+    <p:spTree>
+      <p:nvGrpSpPr>
+        <p:cNvPr id="1" name="Shape 255"/>
+        <p:cNvGrpSpPr/>
+        <p:nvPr/>
+      </p:nvGrpSpPr>
+      <p:grpSpPr>
+        <a:xfrm>
+          <a:off x="0" y="0"/>
+          <a:ext cx="0" cy="0"/>
+          <a:chOff x="0" y="0"/>
+          <a:chExt cx="0" cy="0"/>
+        </a:xfrm>
+      </p:grpSpPr>
+      <p:sp>
+        <p:nvSpPr>
+          <p:cNvPr id="256" name="Google Shape;256;g2a6e7a28048_0_144:notes"/>
+          <p:cNvSpPr txBox="1">
+            <a:spLocks noGrp="1"/>
+          </p:cNvSpPr>
+          <p:nvPr>
+            <p:ph type="body" idx="1"/>
+          </p:nvPr>
+        </p:nvSpPr>
+        <p:spPr>
+          <a:xfrm>
+            <a:off x="685800" y="4343400"/>
+            <a:ext cx="5486400" cy="4114800"/>
+          </a:xfrm>
+          <a:prstGeom prst="rect">
+            <a:avLst/>
+          </a:prstGeom>
+        </p:spPr>
+        <p:txBody>
+          <a:bodyPr spcFirstLastPara="1" wrap="square" lIns="91425" tIns="91425" rIns="91425" bIns="91425" anchor="t" anchorCtr="0">
+            <a:noAutofit/>
+          </a:bodyPr>
+          <a:lstStyle/>
+          <a:p>
+            <a:pPr marL="0" lvl="0" indent="0" algn="l" rtl="0">
+              <a:spcBef>
+                <a:spcPts val="0"/>
+              </a:spcBef>
+              <a:spcAft>
+                <a:spcPts val="0"/>
+              </a:spcAft>
+              <a:buNone/>
+            </a:pPr>
+            <a:endParaRPr/>
+          </a:p>
+        </p:txBody>
+      </p:sp>
+      <p:sp>
+        <p:nvSpPr>
+          <p:cNvPr id="257" name="Google Shape;257;g2a6e7a28048_0_144:notes"/>
+          <p:cNvSpPr>
+            <a:spLocks noGrp="1" noRot="1" noChangeAspect="1"/>
+          </p:cNvSpPr>
+          <p:nvPr>
+            <p:ph type="sldImg" idx="2"/>
+          </p:nvPr>
+        </p:nvSpPr>
+        <p:spPr>
+          <a:xfrm>
+            <a:off x="381000" y="685800"/>
+            <a:ext cx="6096000" cy="3429000"/>
+          </a:xfrm>
+          <a:custGeom>
+            <a:avLst/>
+            <a:gdLst/>
+            <a:ahLst/>
+            <a:cxnLst/>
+            <a:rect l="l" t="t" r="r" b="b"/>
+            <a:pathLst>
+              <a:path w="120000" h="120000" extrusionOk="0">
+                <a:moveTo>
+                  <a:pt x="0" y="0"/>
+                </a:moveTo>
+                <a:lnTo>
+                  <a:pt x="120000" y="0"/>
+                </a:lnTo>
+                <a:lnTo>
+                  <a:pt x="120000" y="120000"/>
+                </a:lnTo>
+                <a:lnTo>
+                  <a:pt x="0" y="120000"/>
+                </a:lnTo>
+                <a:close/>
+              </a:path>
+            </a:pathLst>
+          </a:custGeom>
+        </p:spPr>
+      </p:sp>
+    </p:spTree>
+    <p:extLst>
+      <p:ext uri="{BB962C8B-B14F-4D97-AF65-F5344CB8AC3E}">
+        <p14:creationId xmlns:p14="http://schemas.microsoft.com/office/powerpoint/2010/main" val="610693391"/>
+      </p:ext>
+    </p:extLst>
+  </p:cSld>
+  <p:clrMapOvr>
+    <a:masterClrMapping/>
+  </p:clrMapOvr>
+</p:notes>
+</file>
+
+<file path=ppt/notesSlides/notesSlide13.xml><?xml version="1.0" encoding="utf-8"?>
+<p:notes xmlns:a="http://schemas.openxmlformats.org/drawingml/2006/main" xmlns:r="http://schemas.openxmlformats.org/officeDocument/2006/relationships" xmlns:p="http://schemas.openxmlformats.org/presentationml/2006/main" showMasterSp="0" showMasterPhAnim="0">
+  <p:cSld>
+    <p:spTree>
+      <p:nvGrpSpPr>
+        <p:cNvPr id="1" name="Shape 255"/>
+        <p:cNvGrpSpPr/>
+        <p:nvPr/>
+      </p:nvGrpSpPr>
+      <p:grpSpPr>
+        <a:xfrm>
+          <a:off x="0" y="0"/>
+          <a:ext cx="0" cy="0"/>
+          <a:chOff x="0" y="0"/>
+          <a:chExt cx="0" cy="0"/>
+        </a:xfrm>
+      </p:grpSpPr>
+      <p:sp>
+        <p:nvSpPr>
+          <p:cNvPr id="256" name="Google Shape;256;g2a6e7a28048_0_144:notes"/>
+          <p:cNvSpPr txBox="1">
+            <a:spLocks noGrp="1"/>
+          </p:cNvSpPr>
+          <p:nvPr>
+            <p:ph type="body" idx="1"/>
+          </p:nvPr>
+        </p:nvSpPr>
+        <p:spPr>
+          <a:xfrm>
+            <a:off x="685800" y="4343400"/>
+            <a:ext cx="5486400" cy="4114800"/>
+          </a:xfrm>
+          <a:prstGeom prst="rect">
+            <a:avLst/>
+          </a:prstGeom>
+        </p:spPr>
+        <p:txBody>
+          <a:bodyPr spcFirstLastPara="1" wrap="square" lIns="91425" tIns="91425" rIns="91425" bIns="91425" anchor="t" anchorCtr="0">
+            <a:noAutofit/>
+          </a:bodyPr>
+          <a:lstStyle/>
+          <a:p>
+            <a:pPr marL="0" lvl="0" indent="0" algn="l" rtl="0">
+              <a:spcBef>
+                <a:spcPts val="0"/>
+              </a:spcBef>
+              <a:spcAft>
+                <a:spcPts val="0"/>
+              </a:spcAft>
+              <a:buNone/>
+            </a:pPr>
+            <a:endParaRPr/>
+          </a:p>
+        </p:txBody>
+      </p:sp>
+      <p:sp>
+        <p:nvSpPr>
+          <p:cNvPr id="257" name="Google Shape;257;g2a6e7a28048_0_144:notes"/>
+          <p:cNvSpPr>
+            <a:spLocks noGrp="1" noRot="1" noChangeAspect="1"/>
+          </p:cNvSpPr>
+          <p:nvPr>
+            <p:ph type="sldImg" idx="2"/>
+          </p:nvPr>
+        </p:nvSpPr>
+        <p:spPr>
+          <a:xfrm>
+            <a:off x="381000" y="685800"/>
+            <a:ext cx="6096000" cy="3429000"/>
+          </a:xfrm>
+          <a:custGeom>
+            <a:avLst/>
+            <a:gdLst/>
+            <a:ahLst/>
+            <a:cxnLst/>
+            <a:rect l="l" t="t" r="r" b="b"/>
+            <a:pathLst>
+              <a:path w="120000" h="120000" extrusionOk="0">
+                <a:moveTo>
+                  <a:pt x="0" y="0"/>
+                </a:moveTo>
+                <a:lnTo>
+                  <a:pt x="120000" y="0"/>
+                </a:lnTo>
+                <a:lnTo>
+                  <a:pt x="120000" y="120000"/>
+                </a:lnTo>
+                <a:lnTo>
+                  <a:pt x="0" y="120000"/>
+                </a:lnTo>
+                <a:close/>
+              </a:path>
+            </a:pathLst>
+          </a:custGeom>
+        </p:spPr>
+      </p:sp>
+    </p:spTree>
+    <p:extLst>
+      <p:ext uri="{BB962C8B-B14F-4D97-AF65-F5344CB8AC3E}">
+        <p14:creationId xmlns:p14="http://schemas.microsoft.com/office/powerpoint/2010/main" val="2060037668"/>
+      </p:ext>
+    </p:extLst>
+  </p:cSld>
+  <p:clrMapOvr>
+    <a:masterClrMapping/>
+  </p:clrMapOvr>
+</p:notes>
+</file>
+
+<file path=ppt/notesSlides/notesSlide14.xml><?xml version="1.0" encoding="utf-8"?>
+<p:notes xmlns:a="http://schemas.openxmlformats.org/drawingml/2006/main" xmlns:r="http://schemas.openxmlformats.org/officeDocument/2006/relationships" xmlns:p="http://schemas.openxmlformats.org/presentationml/2006/main" showMasterSp="0" showMasterPhAnim="0">
+  <p:cSld>
+    <p:spTree>
+      <p:nvGrpSpPr>
+        <p:cNvPr id="1" name="Shape 255"/>
+        <p:cNvGrpSpPr/>
+        <p:nvPr/>
+      </p:nvGrpSpPr>
+      <p:grpSpPr>
+        <a:xfrm>
+          <a:off x="0" y="0"/>
+          <a:ext cx="0" cy="0"/>
+          <a:chOff x="0" y="0"/>
+          <a:chExt cx="0" cy="0"/>
+        </a:xfrm>
+      </p:grpSpPr>
+      <p:sp>
+        <p:nvSpPr>
+          <p:cNvPr id="256" name="Google Shape;256;g2a6e7a28048_0_144:notes"/>
+          <p:cNvSpPr txBox="1">
+            <a:spLocks noGrp="1"/>
+          </p:cNvSpPr>
+          <p:nvPr>
+            <p:ph type="body" idx="1"/>
+          </p:nvPr>
+        </p:nvSpPr>
+        <p:spPr>
+          <a:xfrm>
+            <a:off x="685800" y="4343400"/>
+            <a:ext cx="5486400" cy="4114800"/>
+          </a:xfrm>
+          <a:prstGeom prst="rect">
+            <a:avLst/>
+          </a:prstGeom>
+        </p:spPr>
+        <p:txBody>
+          <a:bodyPr spcFirstLastPara="1" wrap="square" lIns="91425" tIns="91425" rIns="91425" bIns="91425" anchor="t" anchorCtr="0">
+            <a:noAutofit/>
+          </a:bodyPr>
+          <a:lstStyle/>
+          <a:p>
+            <a:pPr marL="0" lvl="0" indent="0" algn="l" rtl="0">
+              <a:spcBef>
+                <a:spcPts val="0"/>
+              </a:spcBef>
+              <a:spcAft>
+                <a:spcPts val="0"/>
+              </a:spcAft>
+              <a:buNone/>
+            </a:pPr>
+            <a:endParaRPr/>
+          </a:p>
+        </p:txBody>
+      </p:sp>
+      <p:sp>
+        <p:nvSpPr>
+          <p:cNvPr id="257" name="Google Shape;257;g2a6e7a28048_0_144:notes"/>
+          <p:cNvSpPr>
+            <a:spLocks noGrp="1" noRot="1" noChangeAspect="1"/>
+          </p:cNvSpPr>
+          <p:nvPr>
+            <p:ph type="sldImg" idx="2"/>
+          </p:nvPr>
+        </p:nvSpPr>
+        <p:spPr>
+          <a:xfrm>
+            <a:off x="381000" y="685800"/>
+            <a:ext cx="6096000" cy="3429000"/>
+          </a:xfrm>
+          <a:custGeom>
+            <a:avLst/>
+            <a:gdLst/>
+            <a:ahLst/>
+            <a:cxnLst/>
+            <a:rect l="l" t="t" r="r" b="b"/>
+            <a:pathLst>
+              <a:path w="120000" h="120000" extrusionOk="0">
+                <a:moveTo>
+                  <a:pt x="0" y="0"/>
+                </a:moveTo>
+                <a:lnTo>
+                  <a:pt x="120000" y="0"/>
+                </a:lnTo>
+                <a:lnTo>
+                  <a:pt x="120000" y="120000"/>
+                </a:lnTo>
+                <a:lnTo>
+                  <a:pt x="0" y="120000"/>
+                </a:lnTo>
+                <a:close/>
+              </a:path>
+            </a:pathLst>
+          </a:custGeom>
+        </p:spPr>
+      </p:sp>
+    </p:spTree>
+    <p:extLst>
+      <p:ext uri="{BB962C8B-B14F-4D97-AF65-F5344CB8AC3E}">
+        <p14:creationId xmlns:p14="http://schemas.microsoft.com/office/powerpoint/2010/main" val="1140930856"/>
+      </p:ext>
+    </p:extLst>
+  </p:cSld>
+  <p:clrMapOvr>
+    <a:masterClrMapping/>
+  </p:clrMapOvr>
+</p:notes>
+</file>
+
+<file path=ppt/notesSlides/notesSlide15.xml><?xml version="1.0" encoding="utf-8"?>
+<p:notes xmlns:a="http://schemas.openxmlformats.org/drawingml/2006/main" xmlns:r="http://schemas.openxmlformats.org/officeDocument/2006/relationships" xmlns:p="http://schemas.openxmlformats.org/presentationml/2006/main" showMasterSp="0" showMasterPhAnim="0">
+  <p:cSld>
+    <p:spTree>
+      <p:nvGrpSpPr>
+        <p:cNvPr id="1" name="Shape 255"/>
+        <p:cNvGrpSpPr/>
+        <p:nvPr/>
+      </p:nvGrpSpPr>
+      <p:grpSpPr>
+        <a:xfrm>
+          <a:off x="0" y="0"/>
+          <a:ext cx="0" cy="0"/>
+          <a:chOff x="0" y="0"/>
+          <a:chExt cx="0" cy="0"/>
+        </a:xfrm>
+      </p:grpSpPr>
+      <p:sp>
+        <p:nvSpPr>
+          <p:cNvPr id="256" name="Google Shape;256;g2a6e7a28048_0_144:notes"/>
+          <p:cNvSpPr txBox="1">
+            <a:spLocks noGrp="1"/>
+          </p:cNvSpPr>
+          <p:nvPr>
+            <p:ph type="body" idx="1"/>
+          </p:nvPr>
+        </p:nvSpPr>
+        <p:spPr>
+          <a:xfrm>
+            <a:off x="685800" y="4343400"/>
+            <a:ext cx="5486400" cy="4114800"/>
+          </a:xfrm>
+          <a:prstGeom prst="rect">
+            <a:avLst/>
+          </a:prstGeom>
+        </p:spPr>
+        <p:txBody>
+          <a:bodyPr spcFirstLastPara="1" wrap="square" lIns="91425" tIns="91425" rIns="91425" bIns="91425" anchor="t" anchorCtr="0">
+            <a:noAutofit/>
+          </a:bodyPr>
+          <a:lstStyle/>
+          <a:p>
+            <a:pPr marL="0" lvl="0" indent="0" algn="l" rtl="0">
+              <a:spcBef>
+                <a:spcPts val="0"/>
+              </a:spcBef>
+              <a:spcAft>
+                <a:spcPts val="0"/>
+              </a:spcAft>
+              <a:buNone/>
+            </a:pPr>
+            <a:endParaRPr/>
+          </a:p>
+        </p:txBody>
+      </p:sp>
+      <p:sp>
+        <p:nvSpPr>
+          <p:cNvPr id="257" name="Google Shape;257;g2a6e7a28048_0_144:notes"/>
+          <p:cNvSpPr>
+            <a:spLocks noGrp="1" noRot="1" noChangeAspect="1"/>
+          </p:cNvSpPr>
+          <p:nvPr>
+            <p:ph type="sldImg" idx="2"/>
+          </p:nvPr>
+        </p:nvSpPr>
+        <p:spPr>
+          <a:xfrm>
+            <a:off x="381000" y="685800"/>
+            <a:ext cx="6096000" cy="3429000"/>
+          </a:xfrm>
+          <a:custGeom>
+            <a:avLst/>
+            <a:gdLst/>
+            <a:ahLst/>
+            <a:cxnLst/>
+            <a:rect l="l" t="t" r="r" b="b"/>
+            <a:pathLst>
+              <a:path w="120000" h="120000" extrusionOk="0">
+                <a:moveTo>
+                  <a:pt x="0" y="0"/>
+                </a:moveTo>
+                <a:lnTo>
+                  <a:pt x="120000" y="0"/>
+                </a:lnTo>
+                <a:lnTo>
+                  <a:pt x="120000" y="120000"/>
+                </a:lnTo>
+                <a:lnTo>
+                  <a:pt x="0" y="120000"/>
+                </a:lnTo>
+                <a:close/>
+              </a:path>
+            </a:pathLst>
+          </a:custGeom>
+        </p:spPr>
+      </p:sp>
+    </p:spTree>
+    <p:extLst>
+      <p:ext uri="{BB962C8B-B14F-4D97-AF65-F5344CB8AC3E}">
+        <p14:creationId xmlns:p14="http://schemas.microsoft.com/office/powerpoint/2010/main" val="3679109143"/>
+      </p:ext>
+    </p:extLst>
+  </p:cSld>
+  <p:clrMapOvr>
+    <a:masterClrMapping/>
+  </p:clrMapOvr>
+</p:notes>
+</file>
+
+<file path=ppt/notesSlides/notesSlide16.xml><?xml version="1.0" encoding="utf-8"?>
+<p:notes xmlns:a="http://schemas.openxmlformats.org/drawingml/2006/main" xmlns:r="http://schemas.openxmlformats.org/officeDocument/2006/relationships" xmlns:p="http://schemas.openxmlformats.org/presentationml/2006/main" showMasterSp="0" showMasterPhAnim="0">
+  <p:cSld>
+    <p:spTree>
+      <p:nvGrpSpPr>
+        <p:cNvPr id="1" name="Shape 255"/>
+        <p:cNvGrpSpPr/>
+        <p:nvPr/>
+      </p:nvGrpSpPr>
+      <p:grpSpPr>
+        <a:xfrm>
+          <a:off x="0" y="0"/>
+          <a:ext cx="0" cy="0"/>
+          <a:chOff x="0" y="0"/>
+          <a:chExt cx="0" cy="0"/>
+        </a:xfrm>
+      </p:grpSpPr>
+      <p:sp>
+        <p:nvSpPr>
+          <p:cNvPr id="256" name="Google Shape;256;g2a6e7a28048_0_144:notes"/>
+          <p:cNvSpPr txBox="1">
+            <a:spLocks noGrp="1"/>
+          </p:cNvSpPr>
+          <p:nvPr>
+            <p:ph type="body" idx="1"/>
+          </p:nvPr>
+        </p:nvSpPr>
+        <p:spPr>
+          <a:xfrm>
+            <a:off x="685800" y="4343400"/>
+            <a:ext cx="5486400" cy="4114800"/>
+          </a:xfrm>
+          <a:prstGeom prst="rect">
+            <a:avLst/>
+          </a:prstGeom>
+        </p:spPr>
+        <p:txBody>
+          <a:bodyPr spcFirstLastPara="1" wrap="square" lIns="91425" tIns="91425" rIns="91425" bIns="91425" anchor="t" anchorCtr="0">
+            <a:noAutofit/>
+          </a:bodyPr>
+          <a:lstStyle/>
+          <a:p>
+            <a:pPr marL="0" lvl="0" indent="0" algn="l" rtl="0">
+              <a:spcBef>
+                <a:spcPts val="0"/>
+              </a:spcBef>
+              <a:spcAft>
+                <a:spcPts val="0"/>
+              </a:spcAft>
+              <a:buNone/>
+            </a:pPr>
+            <a:endParaRPr/>
+          </a:p>
+        </p:txBody>
+      </p:sp>
+      <p:sp>
+        <p:nvSpPr>
+          <p:cNvPr id="257" name="Google Shape;257;g2a6e7a28048_0_144:notes"/>
+          <p:cNvSpPr>
+            <a:spLocks noGrp="1" noRot="1" noChangeAspect="1"/>
+          </p:cNvSpPr>
+          <p:nvPr>
+            <p:ph type="sldImg" idx="2"/>
+          </p:nvPr>
+        </p:nvSpPr>
+        <p:spPr>
+          <a:xfrm>
+            <a:off x="381000" y="685800"/>
+            <a:ext cx="6096000" cy="3429000"/>
+          </a:xfrm>
+          <a:custGeom>
+            <a:avLst/>
+            <a:gdLst/>
+            <a:ahLst/>
+            <a:cxnLst/>
+            <a:rect l="l" t="t" r="r" b="b"/>
+            <a:pathLst>
+              <a:path w="120000" h="120000" extrusionOk="0">
+                <a:moveTo>
+                  <a:pt x="0" y="0"/>
+                </a:moveTo>
+                <a:lnTo>
+                  <a:pt x="120000" y="0"/>
+                </a:lnTo>
+                <a:lnTo>
+                  <a:pt x="120000" y="120000"/>
+                </a:lnTo>
+                <a:lnTo>
+                  <a:pt x="0" y="120000"/>
+                </a:lnTo>
+                <a:close/>
+              </a:path>
+            </a:pathLst>
+          </a:custGeom>
+        </p:spPr>
+      </p:sp>
+    </p:spTree>
+    <p:extLst>
+      <p:ext uri="{BB962C8B-B14F-4D97-AF65-F5344CB8AC3E}">
+        <p14:creationId xmlns:p14="http://schemas.microsoft.com/office/powerpoint/2010/main" val="1226221765"/>
+      </p:ext>
+    </p:extLst>
+  </p:cSld>
+  <p:clrMapOvr>
+    <a:masterClrMapping/>
+  </p:clrMapOvr>
+</p:notes>
+</file>
+
+<file path=ppt/notesSlides/notesSlide17.xml><?xml version="1.0" encoding="utf-8"?>
+<p:notes xmlns:a="http://schemas.openxmlformats.org/drawingml/2006/main" xmlns:r="http://schemas.openxmlformats.org/officeDocument/2006/relationships" xmlns:p="http://schemas.openxmlformats.org/presentationml/2006/main" showMasterSp="0" showMasterPhAnim="0">
+  <p:cSld>
+    <p:spTree>
+      <p:nvGrpSpPr>
+        <p:cNvPr id="1" name="Shape 255"/>
+        <p:cNvGrpSpPr/>
+        <p:nvPr/>
+      </p:nvGrpSpPr>
+      <p:grpSpPr>
+        <a:xfrm>
+          <a:off x="0" y="0"/>
+          <a:ext cx="0" cy="0"/>
+          <a:chOff x="0" y="0"/>
+          <a:chExt cx="0" cy="0"/>
+        </a:xfrm>
+      </p:grpSpPr>
+      <p:sp>
+        <p:nvSpPr>
+          <p:cNvPr id="256" name="Google Shape;256;g2a6e7a28048_0_144:notes"/>
+          <p:cNvSpPr txBox="1">
+            <a:spLocks noGrp="1"/>
+          </p:cNvSpPr>
+          <p:nvPr>
+            <p:ph type="body" idx="1"/>
+          </p:nvPr>
+        </p:nvSpPr>
+        <p:spPr>
+          <a:xfrm>
+            <a:off x="685800" y="4343400"/>
+            <a:ext cx="5486400" cy="4114800"/>
+          </a:xfrm>
+          <a:prstGeom prst="rect">
+            <a:avLst/>
+          </a:prstGeom>
+        </p:spPr>
+        <p:txBody>
+          <a:bodyPr spcFirstLastPara="1" wrap="square" lIns="91425" tIns="91425" rIns="91425" bIns="91425" anchor="t" anchorCtr="0">
+            <a:noAutofit/>
+          </a:bodyPr>
+          <a:lstStyle/>
+          <a:p>
+            <a:pPr marL="0" lvl="0" indent="0" algn="l" rtl="0">
+              <a:spcBef>
+                <a:spcPts val="0"/>
+              </a:spcBef>
+              <a:spcAft>
+                <a:spcPts val="0"/>
+              </a:spcAft>
+              <a:buNone/>
+            </a:pPr>
+            <a:endParaRPr/>
+          </a:p>
+        </p:txBody>
+      </p:sp>
+      <p:sp>
+        <p:nvSpPr>
+          <p:cNvPr id="257" name="Google Shape;257;g2a6e7a28048_0_144:notes"/>
+          <p:cNvSpPr>
+            <a:spLocks noGrp="1" noRot="1" noChangeAspect="1"/>
+          </p:cNvSpPr>
+          <p:nvPr>
+            <p:ph type="sldImg" idx="2"/>
+          </p:nvPr>
+        </p:nvSpPr>
+        <p:spPr>
+          <a:xfrm>
+            <a:off x="381000" y="685800"/>
+            <a:ext cx="6096000" cy="3429000"/>
+          </a:xfrm>
+          <a:custGeom>
+            <a:avLst/>
+            <a:gdLst/>
+            <a:ahLst/>
+            <a:cxnLst/>
+            <a:rect l="l" t="t" r="r" b="b"/>
+            <a:pathLst>
+              <a:path w="120000" h="120000" extrusionOk="0">
+                <a:moveTo>
+                  <a:pt x="0" y="0"/>
+                </a:moveTo>
+                <a:lnTo>
+                  <a:pt x="120000" y="0"/>
+                </a:lnTo>
+                <a:lnTo>
+                  <a:pt x="120000" y="120000"/>
+                </a:lnTo>
+                <a:lnTo>
+                  <a:pt x="0" y="120000"/>
+                </a:lnTo>
+                <a:close/>
+              </a:path>
+            </a:pathLst>
+          </a:custGeom>
+        </p:spPr>
+      </p:sp>
+    </p:spTree>
+    <p:extLst>
+      <p:ext uri="{BB962C8B-B14F-4D97-AF65-F5344CB8AC3E}">
+        <p14:creationId xmlns:p14="http://schemas.microsoft.com/office/powerpoint/2010/main" val="1310971986"/>
+      </p:ext>
+    </p:extLst>
+  </p:cSld>
+  <p:clrMapOvr>
+    <a:masterClrMapping/>
+  </p:clrMapOvr>
+</p:notes>
+</file>
+
+<file path=ppt/notesSlides/notesSlide18.xml><?xml version="1.0" encoding="utf-8"?>
+<p:notes xmlns:a="http://schemas.openxmlformats.org/drawingml/2006/main" xmlns:r="http://schemas.openxmlformats.org/officeDocument/2006/relationships" xmlns:p="http://schemas.openxmlformats.org/presentationml/2006/main" showMasterSp="0" showMasterPhAnim="0">
+  <p:cSld>
+    <p:spTree>
+      <p:nvGrpSpPr>
+        <p:cNvPr id="1" name="Shape 255"/>
+        <p:cNvGrpSpPr/>
+        <p:nvPr/>
+      </p:nvGrpSpPr>
+      <p:grpSpPr>
+        <a:xfrm>
+          <a:off x="0" y="0"/>
+          <a:ext cx="0" cy="0"/>
+          <a:chOff x="0" y="0"/>
+          <a:chExt cx="0" cy="0"/>
+        </a:xfrm>
+      </p:grpSpPr>
+      <p:sp>
+        <p:nvSpPr>
+          <p:cNvPr id="256" name="Google Shape;256;g2a6e7a28048_0_144:notes"/>
+          <p:cNvSpPr txBox="1">
+            <a:spLocks noGrp="1"/>
+          </p:cNvSpPr>
+          <p:nvPr>
+            <p:ph type="body" idx="1"/>
+          </p:nvPr>
+        </p:nvSpPr>
+        <p:spPr>
+          <a:xfrm>
+            <a:off x="685800" y="4343400"/>
+            <a:ext cx="5486400" cy="4114800"/>
+          </a:xfrm>
+          <a:prstGeom prst="rect">
+            <a:avLst/>
+          </a:prstGeom>
+        </p:spPr>
+        <p:txBody>
+          <a:bodyPr spcFirstLastPara="1" wrap="square" lIns="91425" tIns="91425" rIns="91425" bIns="91425" anchor="t" anchorCtr="0">
+            <a:noAutofit/>
+          </a:bodyPr>
+          <a:lstStyle/>
+          <a:p>
+            <a:pPr marL="0" lvl="0" indent="0" algn="l" rtl="0">
+              <a:spcBef>
+                <a:spcPts val="0"/>
+              </a:spcBef>
+              <a:spcAft>
+                <a:spcPts val="0"/>
+              </a:spcAft>
+              <a:buNone/>
+            </a:pPr>
+            <a:endParaRPr/>
+          </a:p>
+        </p:txBody>
+      </p:sp>
+      <p:sp>
+        <p:nvSpPr>
+          <p:cNvPr id="257" name="Google Shape;257;g2a6e7a28048_0_144:notes"/>
+          <p:cNvSpPr>
+            <a:spLocks noGrp="1" noRot="1" noChangeAspect="1"/>
+          </p:cNvSpPr>
+          <p:nvPr>
+            <p:ph type="sldImg" idx="2"/>
+          </p:nvPr>
+        </p:nvSpPr>
+        <p:spPr>
+          <a:xfrm>
+            <a:off x="381000" y="685800"/>
+            <a:ext cx="6096000" cy="3429000"/>
+          </a:xfrm>
+          <a:custGeom>
+            <a:avLst/>
+            <a:gdLst/>
+            <a:ahLst/>
+            <a:cxnLst/>
+            <a:rect l="l" t="t" r="r" b="b"/>
+            <a:pathLst>
+              <a:path w="120000" h="120000" extrusionOk="0">
+                <a:moveTo>
+                  <a:pt x="0" y="0"/>
+                </a:moveTo>
+                <a:lnTo>
+                  <a:pt x="120000" y="0"/>
+                </a:lnTo>
+                <a:lnTo>
+                  <a:pt x="120000" y="120000"/>
+                </a:lnTo>
+                <a:lnTo>
+                  <a:pt x="0" y="120000"/>
+                </a:lnTo>
+                <a:close/>
+              </a:path>
+            </a:pathLst>
+          </a:custGeom>
+        </p:spPr>
+      </p:sp>
+    </p:spTree>
+    <p:extLst>
+      <p:ext uri="{BB962C8B-B14F-4D97-AF65-F5344CB8AC3E}">
+        <p14:creationId xmlns:p14="http://schemas.microsoft.com/office/powerpoint/2010/main" val="362229847"/>
+      </p:ext>
+    </p:extLst>
+  </p:cSld>
+  <p:clrMapOvr>
+    <a:masterClrMapping/>
+  </p:clrMapOvr>
+</p:notes>
+</file>
+
+<file path=ppt/notesSlides/notesSlide19.xml><?xml version="1.0" encoding="utf-8"?>
+<p:notes xmlns:a="http://schemas.openxmlformats.org/drawingml/2006/main" xmlns:r="http://schemas.openxmlformats.org/officeDocument/2006/relationships" xmlns:p="http://schemas.openxmlformats.org/presentationml/2006/main" showMasterSp="0" showMasterPhAnim="0">
+  <p:cSld>
+    <p:spTree>
+      <p:nvGrpSpPr>
+        <p:cNvPr id="1" name="Shape 248"/>
+        <p:cNvGrpSpPr/>
+        <p:nvPr/>
+      </p:nvGrpSpPr>
+      <p:grpSpPr>
+        <a:xfrm>
+          <a:off x="0" y="0"/>
+          <a:ext cx="0" cy="0"/>
+          <a:chOff x="0" y="0"/>
+          <a:chExt cx="0" cy="0"/>
+        </a:xfrm>
+      </p:grpSpPr>
+      <p:sp>
+        <p:nvSpPr>
+          <p:cNvPr id="249" name="Google Shape;249;g2a6e7a28048_0_138:notes"/>
+          <p:cNvSpPr txBox="1">
+            <a:spLocks noGrp="1"/>
+          </p:cNvSpPr>
+          <p:nvPr>
+            <p:ph type="body" idx="1"/>
+          </p:nvPr>
+        </p:nvSpPr>
+        <p:spPr>
+          <a:xfrm>
+            <a:off x="685800" y="4343400"/>
+            <a:ext cx="5486400" cy="4114800"/>
+          </a:xfrm>
+          <a:prstGeom prst="rect">
+            <a:avLst/>
+          </a:prstGeom>
+        </p:spPr>
+        <p:txBody>
+          <a:bodyPr spcFirstLastPara="1" wrap="square" lIns="91425" tIns="91425" rIns="91425" bIns="91425" anchor="t" anchorCtr="0">
+            <a:noAutofit/>
+          </a:bodyPr>
+          <a:lstStyle/>
+          <a:p>
+            <a:pPr marL="0" lvl="0" indent="0" algn="l" rtl="0">
+              <a:spcBef>
+                <a:spcPts val="0"/>
+              </a:spcBef>
+              <a:spcAft>
+                <a:spcPts val="0"/>
+              </a:spcAft>
+              <a:buNone/>
+            </a:pPr>
+            <a:endParaRPr/>
+          </a:p>
+        </p:txBody>
+      </p:sp>
+      <p:sp>
+        <p:nvSpPr>
+          <p:cNvPr id="250" name="Google Shape;250;g2a6e7a28048_0_138:notes"/>
           <p:cNvSpPr>
             <a:spLocks noGrp="1" noRot="1" noChangeAspect="1"/>
           </p:cNvSpPr>
@@ -1215,6 +1974,237 @@
       <p:sp>
         <p:nvSpPr>
           <p:cNvPr id="94" name="Google Shape;94;g25e574a55c6_1_3:notes"/>
+          <p:cNvSpPr>
+            <a:spLocks noGrp="1" noRot="1" noChangeAspect="1"/>
+          </p:cNvSpPr>
+          <p:nvPr>
+            <p:ph type="sldImg" idx="2"/>
+          </p:nvPr>
+        </p:nvSpPr>
+        <p:spPr>
+          <a:xfrm>
+            <a:off x="381000" y="685800"/>
+            <a:ext cx="6096000" cy="3429000"/>
+          </a:xfrm>
+          <a:custGeom>
+            <a:avLst/>
+            <a:gdLst/>
+            <a:ahLst/>
+            <a:cxnLst/>
+            <a:rect l="l" t="t" r="r" b="b"/>
+            <a:pathLst>
+              <a:path w="120000" h="120000" extrusionOk="0">
+                <a:moveTo>
+                  <a:pt x="0" y="0"/>
+                </a:moveTo>
+                <a:lnTo>
+                  <a:pt x="120000" y="0"/>
+                </a:lnTo>
+                <a:lnTo>
+                  <a:pt x="120000" y="120000"/>
+                </a:lnTo>
+                <a:lnTo>
+                  <a:pt x="0" y="120000"/>
+                </a:lnTo>
+                <a:close/>
+              </a:path>
+            </a:pathLst>
+          </a:custGeom>
+        </p:spPr>
+      </p:sp>
+    </p:spTree>
+  </p:cSld>
+  <p:clrMapOvr>
+    <a:masterClrMapping/>
+  </p:clrMapOvr>
+</p:notes>
+</file>
+
+<file path=ppt/notesSlides/notesSlide20.xml><?xml version="1.0" encoding="utf-8"?>
+<p:notes xmlns:a="http://schemas.openxmlformats.org/drawingml/2006/main" xmlns:r="http://schemas.openxmlformats.org/officeDocument/2006/relationships" xmlns:p="http://schemas.openxmlformats.org/presentationml/2006/main" showMasterSp="0" showMasterPhAnim="0">
+  <p:cSld>
+    <p:spTree>
+      <p:nvGrpSpPr>
+        <p:cNvPr id="1" name="Shape 255">
+          <a:extLst>
+            <a:ext uri="{FF2B5EF4-FFF2-40B4-BE49-F238E27FC236}">
+              <a16:creationId xmlns:a16="http://schemas.microsoft.com/office/drawing/2014/main" id="{E9051A17-C5E5-C51C-72D0-4780761D06AF}"/>
+            </a:ext>
+          </a:extLst>
+        </p:cNvPr>
+        <p:cNvGrpSpPr/>
+        <p:nvPr/>
+      </p:nvGrpSpPr>
+      <p:grpSpPr>
+        <a:xfrm>
+          <a:off x="0" y="0"/>
+          <a:ext cx="0" cy="0"/>
+          <a:chOff x="0" y="0"/>
+          <a:chExt cx="0" cy="0"/>
+        </a:xfrm>
+      </p:grpSpPr>
+      <p:sp>
+        <p:nvSpPr>
+          <p:cNvPr id="256" name="Google Shape;256;g2a6e7a28048_0_144:notes">
+            <a:extLst>
+              <a:ext uri="{FF2B5EF4-FFF2-40B4-BE49-F238E27FC236}">
+                <a16:creationId xmlns:a16="http://schemas.microsoft.com/office/drawing/2014/main" id="{9A3FD228-A60C-CC52-4D12-489F9033448B}"/>
+              </a:ext>
+            </a:extLst>
+          </p:cNvPr>
+          <p:cNvSpPr txBox="1">
+            <a:spLocks noGrp="1"/>
+          </p:cNvSpPr>
+          <p:nvPr>
+            <p:ph type="body" idx="1"/>
+          </p:nvPr>
+        </p:nvSpPr>
+        <p:spPr>
+          <a:xfrm>
+            <a:off x="685800" y="4343400"/>
+            <a:ext cx="5486400" cy="4114800"/>
+          </a:xfrm>
+          <a:prstGeom prst="rect">
+            <a:avLst/>
+          </a:prstGeom>
+        </p:spPr>
+        <p:txBody>
+          <a:bodyPr spcFirstLastPara="1" wrap="square" lIns="91425" tIns="91425" rIns="91425" bIns="91425" anchor="t" anchorCtr="0">
+            <a:noAutofit/>
+          </a:bodyPr>
+          <a:lstStyle/>
+          <a:p>
+            <a:pPr marL="0" lvl="0" indent="0" algn="l" rtl="0">
+              <a:spcBef>
+                <a:spcPts val="0"/>
+              </a:spcBef>
+              <a:spcAft>
+                <a:spcPts val="0"/>
+              </a:spcAft>
+              <a:buNone/>
+            </a:pPr>
+            <a:endParaRPr/>
+          </a:p>
+        </p:txBody>
+      </p:sp>
+      <p:sp>
+        <p:nvSpPr>
+          <p:cNvPr id="257" name="Google Shape;257;g2a6e7a28048_0_144:notes">
+            <a:extLst>
+              <a:ext uri="{FF2B5EF4-FFF2-40B4-BE49-F238E27FC236}">
+                <a16:creationId xmlns:a16="http://schemas.microsoft.com/office/drawing/2014/main" id="{72617834-EDCB-8961-3680-72701AC0F2D3}"/>
+              </a:ext>
+            </a:extLst>
+          </p:cNvPr>
+          <p:cNvSpPr>
+            <a:spLocks noGrp="1" noRot="1" noChangeAspect="1"/>
+          </p:cNvSpPr>
+          <p:nvPr>
+            <p:ph type="sldImg" idx="2"/>
+          </p:nvPr>
+        </p:nvSpPr>
+        <p:spPr>
+          <a:xfrm>
+            <a:off x="381000" y="685800"/>
+            <a:ext cx="6096000" cy="3429000"/>
+          </a:xfrm>
+          <a:custGeom>
+            <a:avLst/>
+            <a:gdLst/>
+            <a:ahLst/>
+            <a:cxnLst/>
+            <a:rect l="l" t="t" r="r" b="b"/>
+            <a:pathLst>
+              <a:path w="120000" h="120000" extrusionOk="0">
+                <a:moveTo>
+                  <a:pt x="0" y="0"/>
+                </a:moveTo>
+                <a:lnTo>
+                  <a:pt x="120000" y="0"/>
+                </a:lnTo>
+                <a:lnTo>
+                  <a:pt x="120000" y="120000"/>
+                </a:lnTo>
+                <a:lnTo>
+                  <a:pt x="0" y="120000"/>
+                </a:lnTo>
+                <a:close/>
+              </a:path>
+            </a:pathLst>
+          </a:custGeom>
+        </p:spPr>
+      </p:sp>
+    </p:spTree>
+    <p:extLst>
+      <p:ext uri="{BB962C8B-B14F-4D97-AF65-F5344CB8AC3E}">
+        <p14:creationId xmlns:p14="http://schemas.microsoft.com/office/powerpoint/2010/main" val="3638223030"/>
+      </p:ext>
+    </p:extLst>
+  </p:cSld>
+  <p:clrMapOvr>
+    <a:masterClrMapping/>
+  </p:clrMapOvr>
+</p:notes>
+</file>
+
+<file path=ppt/notesSlides/notesSlide21.xml><?xml version="1.0" encoding="utf-8"?>
+<p:notes xmlns:a="http://schemas.openxmlformats.org/drawingml/2006/main" xmlns:r="http://schemas.openxmlformats.org/officeDocument/2006/relationships" xmlns:p="http://schemas.openxmlformats.org/presentationml/2006/main" showMasterSp="0" showMasterPhAnim="0">
+  <p:cSld>
+    <p:spTree>
+      <p:nvGrpSpPr>
+        <p:cNvPr id="1" name="Shape 262"/>
+        <p:cNvGrpSpPr/>
+        <p:nvPr/>
+      </p:nvGrpSpPr>
+      <p:grpSpPr>
+        <a:xfrm>
+          <a:off x="0" y="0"/>
+          <a:ext cx="0" cy="0"/>
+          <a:chOff x="0" y="0"/>
+          <a:chExt cx="0" cy="0"/>
+        </a:xfrm>
+      </p:grpSpPr>
+      <p:sp>
+        <p:nvSpPr>
+          <p:cNvPr id="263" name="Google Shape;263;g25e574a55c6_3_317:notes"/>
+          <p:cNvSpPr txBox="1">
+            <a:spLocks noGrp="1"/>
+          </p:cNvSpPr>
+          <p:nvPr>
+            <p:ph type="body" idx="1"/>
+          </p:nvPr>
+        </p:nvSpPr>
+        <p:spPr>
+          <a:xfrm>
+            <a:off x="685800" y="4343400"/>
+            <a:ext cx="5486400" cy="4114800"/>
+          </a:xfrm>
+          <a:prstGeom prst="rect">
+            <a:avLst/>
+          </a:prstGeom>
+        </p:spPr>
+        <p:txBody>
+          <a:bodyPr spcFirstLastPara="1" wrap="square" lIns="91425" tIns="91425" rIns="91425" bIns="91425" anchor="t" anchorCtr="0">
+            <a:noAutofit/>
+          </a:bodyPr>
+          <a:lstStyle/>
+          <a:p>
+            <a:pPr marL="0" lvl="0" indent="0" algn="l" rtl="0">
+              <a:spcBef>
+                <a:spcPts val="0"/>
+              </a:spcBef>
+              <a:spcAft>
+                <a:spcPts val="0"/>
+              </a:spcAft>
+              <a:buNone/>
+            </a:pPr>
+            <a:endParaRPr/>
+          </a:p>
+        </p:txBody>
+      </p:sp>
+      <p:sp>
+        <p:nvSpPr>
+          <p:cNvPr id="264" name="Google Shape;264;g25e574a55c6_3_317:notes"/>
           <p:cNvSpPr>
             <a:spLocks noGrp="1" noRot="1" noChangeAspect="1"/>
           </p:cNvSpPr>
@@ -13527,6 +14517,1291 @@
   <p:cSld>
     <p:spTree>
       <p:nvGrpSpPr>
+        <p:cNvPr id="1" name="Shape 258"/>
+        <p:cNvGrpSpPr/>
+        <p:nvPr/>
+      </p:nvGrpSpPr>
+      <p:grpSpPr>
+        <a:xfrm>
+          <a:off x="0" y="0"/>
+          <a:ext cx="0" cy="0"/>
+          <a:chOff x="0" y="0"/>
+          <a:chExt cx="0" cy="0"/>
+        </a:xfrm>
+      </p:grpSpPr>
+      <p:pic>
+        <p:nvPicPr>
+          <p:cNvPr id="7" name="Picture 6" descr="A screenshot of a computer&#10;&#10;Description automatically generated">
+            <a:extLst>
+              <a:ext uri="{FF2B5EF4-FFF2-40B4-BE49-F238E27FC236}">
+                <a16:creationId xmlns:a16="http://schemas.microsoft.com/office/drawing/2014/main" id="{765E9884-2F16-587F-143C-3F24DAA86C0E}"/>
+              </a:ext>
+            </a:extLst>
+          </p:cNvPr>
+          <p:cNvPicPr>
+            <a:picLocks noChangeAspect="1"/>
+          </p:cNvPicPr>
+          <p:nvPr/>
+        </p:nvPicPr>
+        <p:blipFill rotWithShape="1">
+          <a:blip r:embed="rId3"/>
+          <a:srcRect b="19"/>
+          <a:stretch/>
+        </p:blipFill>
+        <p:spPr>
+          <a:xfrm>
+            <a:off x="872065" y="800364"/>
+            <a:ext cx="10727267" cy="6034088"/>
+          </a:xfrm>
+          <a:prstGeom prst="rect">
+            <a:avLst/>
+          </a:prstGeom>
+        </p:spPr>
+      </p:pic>
+      <p:sp>
+        <p:nvSpPr>
+          <p:cNvPr id="3" name="Google Shape;260;p37">
+            <a:extLst>
+              <a:ext uri="{FF2B5EF4-FFF2-40B4-BE49-F238E27FC236}">
+                <a16:creationId xmlns:a16="http://schemas.microsoft.com/office/drawing/2014/main" id="{4408872F-483C-1793-D823-90F420F03E75}"/>
+              </a:ext>
+            </a:extLst>
+          </p:cNvPr>
+          <p:cNvSpPr/>
+          <p:nvPr/>
+        </p:nvSpPr>
+        <p:spPr>
+          <a:xfrm>
+            <a:off x="0" y="0"/>
+            <a:ext cx="4318000" cy="776817"/>
+          </a:xfrm>
+          <a:prstGeom prst="homePlate">
+            <a:avLst>
+              <a:gd name="adj" fmla="val 50000"/>
+            </a:avLst>
+          </a:prstGeom>
+          <a:gradFill>
+            <a:gsLst>
+              <a:gs pos="0">
+                <a:srgbClr val="E30000"/>
+              </a:gs>
+              <a:gs pos="100000">
+                <a:srgbClr val="760303"/>
+              </a:gs>
+            </a:gsLst>
+            <a:lin ang="0" scaled="0"/>
+          </a:gradFill>
+          <a:ln w="12700" cap="flat" cmpd="sng">
+            <a:solidFill>
+              <a:srgbClr val="42719B"/>
+            </a:solidFill>
+            <a:prstDash val="solid"/>
+            <a:miter lim="800000"/>
+            <a:headEnd type="none" w="sm" len="sm"/>
+            <a:tailEnd type="none" w="sm" len="sm"/>
+          </a:ln>
+        </p:spPr>
+        <p:txBody>
+          <a:bodyPr spcFirstLastPara="1" wrap="square" lIns="91425" tIns="45700" rIns="91425" bIns="45700" anchor="ctr" anchorCtr="0">
+            <a:noAutofit/>
+          </a:bodyPr>
+          <a:lstStyle/>
+          <a:p>
+            <a:pPr marL="0" marR="0" lvl="0" indent="0" algn="ctr" rtl="0">
+              <a:spcBef>
+                <a:spcPts val="0"/>
+              </a:spcBef>
+              <a:spcAft>
+                <a:spcPts val="0"/>
+              </a:spcAft>
+              <a:buNone/>
+            </a:pPr>
+            <a:r>
+              <a:rPr lang="en-GB" sz="2800" dirty="0">
+                <a:solidFill>
+                  <a:schemeClr val="lt1"/>
+                </a:solidFill>
+                <a:latin typeface="Times New Roman"/>
+                <a:ea typeface="Times New Roman"/>
+                <a:cs typeface="Times New Roman"/>
+                <a:sym typeface="Times New Roman"/>
+              </a:rPr>
+              <a:t>Home Component</a:t>
+            </a:r>
+            <a:endParaRPr sz="2800" dirty="0">
+              <a:solidFill>
+                <a:schemeClr val="lt1"/>
+              </a:solidFill>
+              <a:latin typeface="Times New Roman"/>
+              <a:ea typeface="Times New Roman"/>
+              <a:cs typeface="Times New Roman"/>
+              <a:sym typeface="Times New Roman"/>
+            </a:endParaRPr>
+          </a:p>
+        </p:txBody>
+      </p:sp>
+    </p:spTree>
+    <p:extLst>
+      <p:ext uri="{BB962C8B-B14F-4D97-AF65-F5344CB8AC3E}">
+        <p14:creationId xmlns:p14="http://schemas.microsoft.com/office/powerpoint/2010/main" val="3565841572"/>
+      </p:ext>
+    </p:extLst>
+  </p:cSld>
+  <p:clrMapOvr>
+    <a:masterClrMapping/>
+  </p:clrMapOvr>
+</p:sld>
+</file>
+
+<file path=ppt/slides/slide11.xml><?xml version="1.0" encoding="utf-8"?>
+<p:sld xmlns:a="http://schemas.openxmlformats.org/drawingml/2006/main" xmlns:r="http://schemas.openxmlformats.org/officeDocument/2006/relationships" xmlns:p="http://schemas.openxmlformats.org/presentationml/2006/main">
+  <p:cSld>
+    <p:spTree>
+      <p:nvGrpSpPr>
+        <p:cNvPr id="1" name="Shape 258"/>
+        <p:cNvGrpSpPr/>
+        <p:nvPr/>
+      </p:nvGrpSpPr>
+      <p:grpSpPr>
+        <a:xfrm>
+          <a:off x="0" y="0"/>
+          <a:ext cx="0" cy="0"/>
+          <a:chOff x="0" y="0"/>
+          <a:chExt cx="0" cy="0"/>
+        </a:xfrm>
+      </p:grpSpPr>
+      <p:pic>
+        <p:nvPicPr>
+          <p:cNvPr id="3" name="Picture 2">
+            <a:extLst>
+              <a:ext uri="{FF2B5EF4-FFF2-40B4-BE49-F238E27FC236}">
+                <a16:creationId xmlns:a16="http://schemas.microsoft.com/office/drawing/2014/main" id="{80C610F2-AEE4-A89E-A98B-7C31B401D9A5}"/>
+              </a:ext>
+            </a:extLst>
+          </p:cNvPr>
+          <p:cNvPicPr>
+            <a:picLocks noChangeAspect="1"/>
+          </p:cNvPicPr>
+          <p:nvPr/>
+        </p:nvPicPr>
+        <p:blipFill>
+          <a:blip r:embed="rId3"/>
+          <a:stretch>
+            <a:fillRect/>
+          </a:stretch>
+        </p:blipFill>
+        <p:spPr>
+          <a:xfrm>
+            <a:off x="762000" y="882120"/>
+            <a:ext cx="10337800" cy="5815013"/>
+          </a:xfrm>
+          <a:prstGeom prst="rect">
+            <a:avLst/>
+          </a:prstGeom>
+        </p:spPr>
+      </p:pic>
+      <p:sp>
+        <p:nvSpPr>
+          <p:cNvPr id="2" name="Google Shape;260;p37">
+            <a:extLst>
+              <a:ext uri="{FF2B5EF4-FFF2-40B4-BE49-F238E27FC236}">
+                <a16:creationId xmlns:a16="http://schemas.microsoft.com/office/drawing/2014/main" id="{138D2DC0-97CC-6096-DA44-45DB9B3675F3}"/>
+              </a:ext>
+            </a:extLst>
+          </p:cNvPr>
+          <p:cNvSpPr/>
+          <p:nvPr/>
+        </p:nvSpPr>
+        <p:spPr>
+          <a:xfrm>
+            <a:off x="0" y="0"/>
+            <a:ext cx="4381500" cy="776817"/>
+          </a:xfrm>
+          <a:prstGeom prst="homePlate">
+            <a:avLst>
+              <a:gd name="adj" fmla="val 50000"/>
+            </a:avLst>
+          </a:prstGeom>
+          <a:gradFill>
+            <a:gsLst>
+              <a:gs pos="0">
+                <a:srgbClr val="E30000"/>
+              </a:gs>
+              <a:gs pos="100000">
+                <a:srgbClr val="760303"/>
+              </a:gs>
+            </a:gsLst>
+            <a:lin ang="0" scaled="0"/>
+          </a:gradFill>
+          <a:ln w="12700" cap="flat" cmpd="sng">
+            <a:solidFill>
+              <a:srgbClr val="42719B"/>
+            </a:solidFill>
+            <a:prstDash val="solid"/>
+            <a:miter lim="800000"/>
+            <a:headEnd type="none" w="sm" len="sm"/>
+            <a:tailEnd type="none" w="sm" len="sm"/>
+          </a:ln>
+        </p:spPr>
+        <p:txBody>
+          <a:bodyPr spcFirstLastPara="1" wrap="square" lIns="91425" tIns="45700" rIns="91425" bIns="45700" anchor="ctr" anchorCtr="0">
+            <a:noAutofit/>
+          </a:bodyPr>
+          <a:lstStyle/>
+          <a:p>
+            <a:pPr marL="0" marR="0" lvl="0" indent="0" algn="ctr" rtl="0">
+              <a:spcBef>
+                <a:spcPts val="0"/>
+              </a:spcBef>
+              <a:spcAft>
+                <a:spcPts val="0"/>
+              </a:spcAft>
+              <a:buNone/>
+            </a:pPr>
+            <a:r>
+              <a:rPr lang="en-GB" sz="2800" dirty="0">
+                <a:solidFill>
+                  <a:schemeClr val="lt1"/>
+                </a:solidFill>
+                <a:latin typeface="Times New Roman"/>
+                <a:ea typeface="Times New Roman"/>
+                <a:cs typeface="Times New Roman"/>
+                <a:sym typeface="Times New Roman"/>
+              </a:rPr>
+              <a:t>About Component</a:t>
+            </a:r>
+            <a:endParaRPr sz="2800" dirty="0">
+              <a:solidFill>
+                <a:schemeClr val="lt1"/>
+              </a:solidFill>
+              <a:latin typeface="Times New Roman"/>
+              <a:ea typeface="Times New Roman"/>
+              <a:cs typeface="Times New Roman"/>
+              <a:sym typeface="Times New Roman"/>
+            </a:endParaRPr>
+          </a:p>
+        </p:txBody>
+      </p:sp>
+    </p:spTree>
+    <p:extLst>
+      <p:ext uri="{BB962C8B-B14F-4D97-AF65-F5344CB8AC3E}">
+        <p14:creationId xmlns:p14="http://schemas.microsoft.com/office/powerpoint/2010/main" val="236917969"/>
+      </p:ext>
+    </p:extLst>
+  </p:cSld>
+  <p:clrMapOvr>
+    <a:masterClrMapping/>
+  </p:clrMapOvr>
+</p:sld>
+</file>
+
+<file path=ppt/slides/slide12.xml><?xml version="1.0" encoding="utf-8"?>
+<p:sld xmlns:a="http://schemas.openxmlformats.org/drawingml/2006/main" xmlns:r="http://schemas.openxmlformats.org/officeDocument/2006/relationships" xmlns:p="http://schemas.openxmlformats.org/presentationml/2006/main">
+  <p:cSld>
+    <p:spTree>
+      <p:nvGrpSpPr>
+        <p:cNvPr id="1" name="Shape 258"/>
+        <p:cNvGrpSpPr/>
+        <p:nvPr/>
+      </p:nvGrpSpPr>
+      <p:grpSpPr>
+        <a:xfrm>
+          <a:off x="0" y="0"/>
+          <a:ext cx="0" cy="0"/>
+          <a:chOff x="0" y="0"/>
+          <a:chExt cx="0" cy="0"/>
+        </a:xfrm>
+      </p:grpSpPr>
+      <p:pic>
+        <p:nvPicPr>
+          <p:cNvPr id="4" name="Picture 3">
+            <a:extLst>
+              <a:ext uri="{FF2B5EF4-FFF2-40B4-BE49-F238E27FC236}">
+                <a16:creationId xmlns:a16="http://schemas.microsoft.com/office/drawing/2014/main" id="{BD565CB3-6522-A63F-E405-6E891069726B}"/>
+              </a:ext>
+            </a:extLst>
+          </p:cNvPr>
+          <p:cNvPicPr>
+            <a:picLocks noChangeAspect="1"/>
+          </p:cNvPicPr>
+          <p:nvPr/>
+        </p:nvPicPr>
+        <p:blipFill>
+          <a:blip r:embed="rId3"/>
+          <a:stretch>
+            <a:fillRect/>
+          </a:stretch>
+        </p:blipFill>
+        <p:spPr>
+          <a:xfrm>
+            <a:off x="745067" y="872068"/>
+            <a:ext cx="10430933" cy="5867400"/>
+          </a:xfrm>
+          <a:prstGeom prst="rect">
+            <a:avLst/>
+          </a:prstGeom>
+        </p:spPr>
+      </p:pic>
+      <p:sp>
+        <p:nvSpPr>
+          <p:cNvPr id="2" name="Google Shape;260;p37">
+            <a:extLst>
+              <a:ext uri="{FF2B5EF4-FFF2-40B4-BE49-F238E27FC236}">
+                <a16:creationId xmlns:a16="http://schemas.microsoft.com/office/drawing/2014/main" id="{BF18AE5D-3D41-EA1A-0083-522EDA4F493D}"/>
+              </a:ext>
+            </a:extLst>
+          </p:cNvPr>
+          <p:cNvSpPr/>
+          <p:nvPr/>
+        </p:nvSpPr>
+        <p:spPr>
+          <a:xfrm>
+            <a:off x="0" y="0"/>
+            <a:ext cx="4330700" cy="776817"/>
+          </a:xfrm>
+          <a:prstGeom prst="homePlate">
+            <a:avLst>
+              <a:gd name="adj" fmla="val 50000"/>
+            </a:avLst>
+          </a:prstGeom>
+          <a:gradFill>
+            <a:gsLst>
+              <a:gs pos="0">
+                <a:srgbClr val="E30000"/>
+              </a:gs>
+              <a:gs pos="100000">
+                <a:srgbClr val="760303"/>
+              </a:gs>
+            </a:gsLst>
+            <a:lin ang="0" scaled="0"/>
+          </a:gradFill>
+          <a:ln w="12700" cap="flat" cmpd="sng">
+            <a:solidFill>
+              <a:srgbClr val="42719B"/>
+            </a:solidFill>
+            <a:prstDash val="solid"/>
+            <a:miter lim="800000"/>
+            <a:headEnd type="none" w="sm" len="sm"/>
+            <a:tailEnd type="none" w="sm" len="sm"/>
+          </a:ln>
+        </p:spPr>
+        <p:txBody>
+          <a:bodyPr spcFirstLastPara="1" wrap="square" lIns="91425" tIns="45700" rIns="91425" bIns="45700" anchor="ctr" anchorCtr="0">
+            <a:noAutofit/>
+          </a:bodyPr>
+          <a:lstStyle/>
+          <a:p>
+            <a:pPr marL="0" marR="0" lvl="0" indent="0" algn="ctr" rtl="0">
+              <a:spcBef>
+                <a:spcPts val="0"/>
+              </a:spcBef>
+              <a:spcAft>
+                <a:spcPts val="0"/>
+              </a:spcAft>
+              <a:buNone/>
+            </a:pPr>
+            <a:r>
+              <a:rPr lang="en-GB" sz="2800" dirty="0">
+                <a:solidFill>
+                  <a:schemeClr val="lt1"/>
+                </a:solidFill>
+                <a:latin typeface="Times New Roman"/>
+                <a:ea typeface="Times New Roman"/>
+                <a:cs typeface="Times New Roman"/>
+                <a:sym typeface="Times New Roman"/>
+              </a:rPr>
+              <a:t>About Component</a:t>
+            </a:r>
+            <a:endParaRPr sz="2800" dirty="0">
+              <a:solidFill>
+                <a:schemeClr val="lt1"/>
+              </a:solidFill>
+              <a:latin typeface="Times New Roman"/>
+              <a:ea typeface="Times New Roman"/>
+              <a:cs typeface="Times New Roman"/>
+              <a:sym typeface="Times New Roman"/>
+            </a:endParaRPr>
+          </a:p>
+        </p:txBody>
+      </p:sp>
+    </p:spTree>
+    <p:extLst>
+      <p:ext uri="{BB962C8B-B14F-4D97-AF65-F5344CB8AC3E}">
+        <p14:creationId xmlns:p14="http://schemas.microsoft.com/office/powerpoint/2010/main" val="2043624082"/>
+      </p:ext>
+    </p:extLst>
+  </p:cSld>
+  <p:clrMapOvr>
+    <a:masterClrMapping/>
+  </p:clrMapOvr>
+</p:sld>
+</file>
+
+<file path=ppt/slides/slide13.xml><?xml version="1.0" encoding="utf-8"?>
+<p:sld xmlns:a="http://schemas.openxmlformats.org/drawingml/2006/main" xmlns:r="http://schemas.openxmlformats.org/officeDocument/2006/relationships" xmlns:p="http://schemas.openxmlformats.org/presentationml/2006/main">
+  <p:cSld>
+    <p:spTree>
+      <p:nvGrpSpPr>
+        <p:cNvPr id="1" name="Shape 258"/>
+        <p:cNvGrpSpPr/>
+        <p:nvPr/>
+      </p:nvGrpSpPr>
+      <p:grpSpPr>
+        <a:xfrm>
+          <a:off x="0" y="0"/>
+          <a:ext cx="0" cy="0"/>
+          <a:chOff x="0" y="0"/>
+          <a:chExt cx="0" cy="0"/>
+        </a:xfrm>
+      </p:grpSpPr>
+      <p:pic>
+        <p:nvPicPr>
+          <p:cNvPr id="3" name="Picture 2">
+            <a:extLst>
+              <a:ext uri="{FF2B5EF4-FFF2-40B4-BE49-F238E27FC236}">
+                <a16:creationId xmlns:a16="http://schemas.microsoft.com/office/drawing/2014/main" id="{7114B7DD-B782-5E00-AB76-C09E1811D3B9}"/>
+              </a:ext>
+            </a:extLst>
+          </p:cNvPr>
+          <p:cNvPicPr>
+            <a:picLocks noChangeAspect="1"/>
+          </p:cNvPicPr>
+          <p:nvPr/>
+        </p:nvPicPr>
+        <p:blipFill>
+          <a:blip r:embed="rId3"/>
+          <a:stretch>
+            <a:fillRect/>
+          </a:stretch>
+        </p:blipFill>
+        <p:spPr>
+          <a:xfrm>
+            <a:off x="643467" y="844019"/>
+            <a:ext cx="10541000" cy="5929313"/>
+          </a:xfrm>
+          <a:prstGeom prst="rect">
+            <a:avLst/>
+          </a:prstGeom>
+        </p:spPr>
+      </p:pic>
+      <p:sp>
+        <p:nvSpPr>
+          <p:cNvPr id="2" name="Google Shape;260;p37">
+            <a:extLst>
+              <a:ext uri="{FF2B5EF4-FFF2-40B4-BE49-F238E27FC236}">
+                <a16:creationId xmlns:a16="http://schemas.microsoft.com/office/drawing/2014/main" id="{205CE82F-32A4-AE36-FF4F-68302435532A}"/>
+              </a:ext>
+            </a:extLst>
+          </p:cNvPr>
+          <p:cNvSpPr/>
+          <p:nvPr/>
+        </p:nvSpPr>
+        <p:spPr>
+          <a:xfrm>
+            <a:off x="0" y="0"/>
+            <a:ext cx="4305300" cy="776817"/>
+          </a:xfrm>
+          <a:prstGeom prst="homePlate">
+            <a:avLst>
+              <a:gd name="adj" fmla="val 50000"/>
+            </a:avLst>
+          </a:prstGeom>
+          <a:gradFill>
+            <a:gsLst>
+              <a:gs pos="0">
+                <a:srgbClr val="E30000"/>
+              </a:gs>
+              <a:gs pos="100000">
+                <a:srgbClr val="760303"/>
+              </a:gs>
+            </a:gsLst>
+            <a:lin ang="0" scaled="0"/>
+          </a:gradFill>
+          <a:ln w="12700" cap="flat" cmpd="sng">
+            <a:solidFill>
+              <a:srgbClr val="42719B"/>
+            </a:solidFill>
+            <a:prstDash val="solid"/>
+            <a:miter lim="800000"/>
+            <a:headEnd type="none" w="sm" len="sm"/>
+            <a:tailEnd type="none" w="sm" len="sm"/>
+          </a:ln>
+        </p:spPr>
+        <p:txBody>
+          <a:bodyPr spcFirstLastPara="1" wrap="square" lIns="91425" tIns="45700" rIns="91425" bIns="45700" anchor="ctr" anchorCtr="0">
+            <a:noAutofit/>
+          </a:bodyPr>
+          <a:lstStyle/>
+          <a:p>
+            <a:pPr marL="0" marR="0" lvl="0" indent="0" algn="ctr" rtl="0">
+              <a:spcBef>
+                <a:spcPts val="0"/>
+              </a:spcBef>
+              <a:spcAft>
+                <a:spcPts val="0"/>
+              </a:spcAft>
+              <a:buNone/>
+            </a:pPr>
+            <a:r>
+              <a:rPr lang="en-GB" sz="2800" dirty="0">
+                <a:solidFill>
+                  <a:schemeClr val="lt1"/>
+                </a:solidFill>
+                <a:latin typeface="Times New Roman"/>
+                <a:ea typeface="Times New Roman"/>
+                <a:cs typeface="Times New Roman"/>
+                <a:sym typeface="Times New Roman"/>
+              </a:rPr>
+              <a:t>About Component</a:t>
+            </a:r>
+            <a:endParaRPr sz="2800" dirty="0">
+              <a:solidFill>
+                <a:schemeClr val="lt1"/>
+              </a:solidFill>
+              <a:latin typeface="Times New Roman"/>
+              <a:ea typeface="Times New Roman"/>
+              <a:cs typeface="Times New Roman"/>
+              <a:sym typeface="Times New Roman"/>
+            </a:endParaRPr>
+          </a:p>
+        </p:txBody>
+      </p:sp>
+    </p:spTree>
+    <p:extLst>
+      <p:ext uri="{BB962C8B-B14F-4D97-AF65-F5344CB8AC3E}">
+        <p14:creationId xmlns:p14="http://schemas.microsoft.com/office/powerpoint/2010/main" val="618263117"/>
+      </p:ext>
+    </p:extLst>
+  </p:cSld>
+  <p:clrMapOvr>
+    <a:masterClrMapping/>
+  </p:clrMapOvr>
+</p:sld>
+</file>
+
+<file path=ppt/slides/slide14.xml><?xml version="1.0" encoding="utf-8"?>
+<p:sld xmlns:a="http://schemas.openxmlformats.org/drawingml/2006/main" xmlns:r="http://schemas.openxmlformats.org/officeDocument/2006/relationships" xmlns:p="http://schemas.openxmlformats.org/presentationml/2006/main">
+  <p:cSld>
+    <p:spTree>
+      <p:nvGrpSpPr>
+        <p:cNvPr id="1" name="Shape 258"/>
+        <p:cNvGrpSpPr/>
+        <p:nvPr/>
+      </p:nvGrpSpPr>
+      <p:grpSpPr>
+        <a:xfrm>
+          <a:off x="0" y="0"/>
+          <a:ext cx="0" cy="0"/>
+          <a:chOff x="0" y="0"/>
+          <a:chExt cx="0" cy="0"/>
+        </a:xfrm>
+      </p:grpSpPr>
+      <p:pic>
+        <p:nvPicPr>
+          <p:cNvPr id="3" name="Picture 2">
+            <a:extLst>
+              <a:ext uri="{FF2B5EF4-FFF2-40B4-BE49-F238E27FC236}">
+                <a16:creationId xmlns:a16="http://schemas.microsoft.com/office/drawing/2014/main" id="{FC835BAF-745C-0785-C89E-F4FCF3AF58E7}"/>
+              </a:ext>
+            </a:extLst>
+          </p:cNvPr>
+          <p:cNvPicPr>
+            <a:picLocks noChangeAspect="1"/>
+          </p:cNvPicPr>
+          <p:nvPr/>
+        </p:nvPicPr>
+        <p:blipFill>
+          <a:blip r:embed="rId3"/>
+          <a:stretch>
+            <a:fillRect/>
+          </a:stretch>
+        </p:blipFill>
+        <p:spPr>
+          <a:xfrm>
+            <a:off x="1024466" y="872595"/>
+            <a:ext cx="10354733" cy="5824537"/>
+          </a:xfrm>
+          <a:prstGeom prst="rect">
+            <a:avLst/>
+          </a:prstGeom>
+        </p:spPr>
+      </p:pic>
+      <p:sp>
+        <p:nvSpPr>
+          <p:cNvPr id="2" name="Google Shape;260;p37">
+            <a:extLst>
+              <a:ext uri="{FF2B5EF4-FFF2-40B4-BE49-F238E27FC236}">
+                <a16:creationId xmlns:a16="http://schemas.microsoft.com/office/drawing/2014/main" id="{42865BB2-3A9B-E91A-4B0A-CB151F6A1ADE}"/>
+              </a:ext>
+            </a:extLst>
+          </p:cNvPr>
+          <p:cNvSpPr/>
+          <p:nvPr/>
+        </p:nvSpPr>
+        <p:spPr>
+          <a:xfrm>
+            <a:off x="0" y="0"/>
+            <a:ext cx="4373217" cy="776817"/>
+          </a:xfrm>
+          <a:prstGeom prst="homePlate">
+            <a:avLst>
+              <a:gd name="adj" fmla="val 50000"/>
+            </a:avLst>
+          </a:prstGeom>
+          <a:gradFill>
+            <a:gsLst>
+              <a:gs pos="0">
+                <a:srgbClr val="E30000"/>
+              </a:gs>
+              <a:gs pos="100000">
+                <a:srgbClr val="760303"/>
+              </a:gs>
+            </a:gsLst>
+            <a:lin ang="0" scaled="0"/>
+          </a:gradFill>
+          <a:ln w="12700" cap="flat" cmpd="sng">
+            <a:solidFill>
+              <a:srgbClr val="42719B"/>
+            </a:solidFill>
+            <a:prstDash val="solid"/>
+            <a:miter lim="800000"/>
+            <a:headEnd type="none" w="sm" len="sm"/>
+            <a:tailEnd type="none" w="sm" len="sm"/>
+          </a:ln>
+        </p:spPr>
+        <p:txBody>
+          <a:bodyPr spcFirstLastPara="1" wrap="square" lIns="91425" tIns="45700" rIns="91425" bIns="45700" anchor="ctr" anchorCtr="0">
+            <a:noAutofit/>
+          </a:bodyPr>
+          <a:lstStyle/>
+          <a:p>
+            <a:pPr marL="0" marR="0" lvl="0" indent="0" algn="ctr" rtl="0">
+              <a:spcBef>
+                <a:spcPts val="0"/>
+              </a:spcBef>
+              <a:spcAft>
+                <a:spcPts val="0"/>
+              </a:spcAft>
+              <a:buNone/>
+            </a:pPr>
+            <a:r>
+              <a:rPr lang="en-GB" sz="2800" dirty="0">
+                <a:solidFill>
+                  <a:schemeClr val="lt1"/>
+                </a:solidFill>
+                <a:latin typeface="Times New Roman"/>
+                <a:ea typeface="Times New Roman"/>
+                <a:cs typeface="Times New Roman"/>
+                <a:sym typeface="Times New Roman"/>
+              </a:rPr>
+              <a:t>Events Component</a:t>
+            </a:r>
+            <a:endParaRPr sz="2800" dirty="0">
+              <a:solidFill>
+                <a:schemeClr val="lt1"/>
+              </a:solidFill>
+              <a:latin typeface="Times New Roman"/>
+              <a:ea typeface="Times New Roman"/>
+              <a:cs typeface="Times New Roman"/>
+              <a:sym typeface="Times New Roman"/>
+            </a:endParaRPr>
+          </a:p>
+        </p:txBody>
+      </p:sp>
+    </p:spTree>
+    <p:extLst>
+      <p:ext uri="{BB962C8B-B14F-4D97-AF65-F5344CB8AC3E}">
+        <p14:creationId xmlns:p14="http://schemas.microsoft.com/office/powerpoint/2010/main" val="1812165817"/>
+      </p:ext>
+    </p:extLst>
+  </p:cSld>
+  <p:clrMapOvr>
+    <a:masterClrMapping/>
+  </p:clrMapOvr>
+</p:sld>
+</file>
+
+<file path=ppt/slides/slide15.xml><?xml version="1.0" encoding="utf-8"?>
+<p:sld xmlns:a="http://schemas.openxmlformats.org/drawingml/2006/main" xmlns:r="http://schemas.openxmlformats.org/officeDocument/2006/relationships" xmlns:p="http://schemas.openxmlformats.org/presentationml/2006/main">
+  <p:cSld>
+    <p:spTree>
+      <p:nvGrpSpPr>
+        <p:cNvPr id="1" name="Shape 258"/>
+        <p:cNvGrpSpPr/>
+        <p:nvPr/>
+      </p:nvGrpSpPr>
+      <p:grpSpPr>
+        <a:xfrm>
+          <a:off x="0" y="0"/>
+          <a:ext cx="0" cy="0"/>
+          <a:chOff x="0" y="0"/>
+          <a:chExt cx="0" cy="0"/>
+        </a:xfrm>
+      </p:grpSpPr>
+      <p:pic>
+        <p:nvPicPr>
+          <p:cNvPr id="4" name="Picture 3">
+            <a:extLst>
+              <a:ext uri="{FF2B5EF4-FFF2-40B4-BE49-F238E27FC236}">
+                <a16:creationId xmlns:a16="http://schemas.microsoft.com/office/drawing/2014/main" id="{97D3FAE6-F495-4543-25D9-601501B1AC50}"/>
+              </a:ext>
+            </a:extLst>
+          </p:cNvPr>
+          <p:cNvPicPr>
+            <a:picLocks noChangeAspect="1"/>
+          </p:cNvPicPr>
+          <p:nvPr/>
+        </p:nvPicPr>
+        <p:blipFill>
+          <a:blip r:embed="rId3"/>
+          <a:stretch>
+            <a:fillRect/>
+          </a:stretch>
+        </p:blipFill>
+        <p:spPr>
+          <a:xfrm>
+            <a:off x="939800" y="862541"/>
+            <a:ext cx="10312400" cy="5800725"/>
+          </a:xfrm>
+          <a:prstGeom prst="rect">
+            <a:avLst/>
+          </a:prstGeom>
+        </p:spPr>
+      </p:pic>
+      <p:sp>
+        <p:nvSpPr>
+          <p:cNvPr id="2" name="Google Shape;260;p37">
+            <a:extLst>
+              <a:ext uri="{FF2B5EF4-FFF2-40B4-BE49-F238E27FC236}">
+                <a16:creationId xmlns:a16="http://schemas.microsoft.com/office/drawing/2014/main" id="{8AFB8210-99FA-F2E3-7DA3-1CB7BE813DCD}"/>
+              </a:ext>
+            </a:extLst>
+          </p:cNvPr>
+          <p:cNvSpPr/>
+          <p:nvPr/>
+        </p:nvSpPr>
+        <p:spPr>
+          <a:xfrm>
+            <a:off x="0" y="0"/>
+            <a:ext cx="4584700" cy="776817"/>
+          </a:xfrm>
+          <a:prstGeom prst="homePlate">
+            <a:avLst>
+              <a:gd name="adj" fmla="val 50000"/>
+            </a:avLst>
+          </a:prstGeom>
+          <a:gradFill>
+            <a:gsLst>
+              <a:gs pos="0">
+                <a:srgbClr val="E30000"/>
+              </a:gs>
+              <a:gs pos="100000">
+                <a:srgbClr val="760303"/>
+              </a:gs>
+            </a:gsLst>
+            <a:lin ang="0" scaled="0"/>
+          </a:gradFill>
+          <a:ln w="12700" cap="flat" cmpd="sng">
+            <a:solidFill>
+              <a:srgbClr val="42719B"/>
+            </a:solidFill>
+            <a:prstDash val="solid"/>
+            <a:miter lim="800000"/>
+            <a:headEnd type="none" w="sm" len="sm"/>
+            <a:tailEnd type="none" w="sm" len="sm"/>
+          </a:ln>
+        </p:spPr>
+        <p:txBody>
+          <a:bodyPr spcFirstLastPara="1" wrap="square" lIns="91425" tIns="45700" rIns="91425" bIns="45700" anchor="ctr" anchorCtr="0">
+            <a:noAutofit/>
+          </a:bodyPr>
+          <a:lstStyle/>
+          <a:p>
+            <a:pPr marL="0" marR="0" lvl="0" indent="0" algn="ctr" rtl="0">
+              <a:spcBef>
+                <a:spcPts val="0"/>
+              </a:spcBef>
+              <a:spcAft>
+                <a:spcPts val="0"/>
+              </a:spcAft>
+              <a:buNone/>
+            </a:pPr>
+            <a:r>
+              <a:rPr lang="en-GB" sz="2800" dirty="0">
+                <a:solidFill>
+                  <a:schemeClr val="lt1"/>
+                </a:solidFill>
+                <a:latin typeface="Times New Roman"/>
+                <a:ea typeface="Times New Roman"/>
+                <a:cs typeface="Times New Roman"/>
+                <a:sym typeface="Times New Roman"/>
+              </a:rPr>
+              <a:t>Club’s Component</a:t>
+            </a:r>
+            <a:endParaRPr sz="2800" dirty="0">
+              <a:solidFill>
+                <a:schemeClr val="lt1"/>
+              </a:solidFill>
+              <a:latin typeface="Times New Roman"/>
+              <a:ea typeface="Times New Roman"/>
+              <a:cs typeface="Times New Roman"/>
+              <a:sym typeface="Times New Roman"/>
+            </a:endParaRPr>
+          </a:p>
+        </p:txBody>
+      </p:sp>
+    </p:spTree>
+    <p:extLst>
+      <p:ext uri="{BB962C8B-B14F-4D97-AF65-F5344CB8AC3E}">
+        <p14:creationId xmlns:p14="http://schemas.microsoft.com/office/powerpoint/2010/main" val="2814560314"/>
+      </p:ext>
+    </p:extLst>
+  </p:cSld>
+  <p:clrMapOvr>
+    <a:masterClrMapping/>
+  </p:clrMapOvr>
+</p:sld>
+</file>
+
+<file path=ppt/slides/slide16.xml><?xml version="1.0" encoding="utf-8"?>
+<p:sld xmlns:a="http://schemas.openxmlformats.org/drawingml/2006/main" xmlns:r="http://schemas.openxmlformats.org/officeDocument/2006/relationships" xmlns:p="http://schemas.openxmlformats.org/presentationml/2006/main">
+  <p:cSld>
+    <p:spTree>
+      <p:nvGrpSpPr>
+        <p:cNvPr id="1" name="Shape 258"/>
+        <p:cNvGrpSpPr/>
+        <p:nvPr/>
+      </p:nvGrpSpPr>
+      <p:grpSpPr>
+        <a:xfrm>
+          <a:off x="0" y="0"/>
+          <a:ext cx="0" cy="0"/>
+          <a:chOff x="0" y="0"/>
+          <a:chExt cx="0" cy="0"/>
+        </a:xfrm>
+      </p:grpSpPr>
+      <p:pic>
+        <p:nvPicPr>
+          <p:cNvPr id="3" name="Picture 2">
+            <a:extLst>
+              <a:ext uri="{FF2B5EF4-FFF2-40B4-BE49-F238E27FC236}">
+                <a16:creationId xmlns:a16="http://schemas.microsoft.com/office/drawing/2014/main" id="{A2D0DB30-BCCC-7445-F71F-EE56AEF41BAA}"/>
+              </a:ext>
+            </a:extLst>
+          </p:cNvPr>
+          <p:cNvPicPr>
+            <a:picLocks noChangeAspect="1"/>
+          </p:cNvPicPr>
+          <p:nvPr/>
+        </p:nvPicPr>
+        <p:blipFill>
+          <a:blip r:embed="rId3"/>
+          <a:stretch>
+            <a:fillRect/>
+          </a:stretch>
+        </p:blipFill>
+        <p:spPr>
+          <a:xfrm>
+            <a:off x="1354666" y="974195"/>
+            <a:ext cx="9948333" cy="5595937"/>
+          </a:xfrm>
+          <a:prstGeom prst="rect">
+            <a:avLst/>
+          </a:prstGeom>
+        </p:spPr>
+      </p:pic>
+      <p:sp>
+        <p:nvSpPr>
+          <p:cNvPr id="2" name="Google Shape;260;p37">
+            <a:extLst>
+              <a:ext uri="{FF2B5EF4-FFF2-40B4-BE49-F238E27FC236}">
+                <a16:creationId xmlns:a16="http://schemas.microsoft.com/office/drawing/2014/main" id="{1189F9CF-22EE-41C7-3065-8CD852B0E7CA}"/>
+              </a:ext>
+            </a:extLst>
+          </p:cNvPr>
+          <p:cNvSpPr/>
+          <p:nvPr/>
+        </p:nvSpPr>
+        <p:spPr>
+          <a:xfrm>
+            <a:off x="0" y="0"/>
+            <a:ext cx="4191000" cy="776817"/>
+          </a:xfrm>
+          <a:prstGeom prst="homePlate">
+            <a:avLst>
+              <a:gd name="adj" fmla="val 50000"/>
+            </a:avLst>
+          </a:prstGeom>
+          <a:gradFill>
+            <a:gsLst>
+              <a:gs pos="0">
+                <a:srgbClr val="E30000"/>
+              </a:gs>
+              <a:gs pos="100000">
+                <a:srgbClr val="760303"/>
+              </a:gs>
+            </a:gsLst>
+            <a:lin ang="0" scaled="0"/>
+          </a:gradFill>
+          <a:ln w="12700" cap="flat" cmpd="sng">
+            <a:solidFill>
+              <a:srgbClr val="42719B"/>
+            </a:solidFill>
+            <a:prstDash val="solid"/>
+            <a:miter lim="800000"/>
+            <a:headEnd type="none" w="sm" len="sm"/>
+            <a:tailEnd type="none" w="sm" len="sm"/>
+          </a:ln>
+        </p:spPr>
+        <p:txBody>
+          <a:bodyPr spcFirstLastPara="1" wrap="square" lIns="91425" tIns="45700" rIns="91425" bIns="45700" anchor="ctr" anchorCtr="0">
+            <a:noAutofit/>
+          </a:bodyPr>
+          <a:lstStyle/>
+          <a:p>
+            <a:pPr marL="0" marR="0" lvl="0" indent="0" algn="ctr" rtl="0">
+              <a:spcBef>
+                <a:spcPts val="0"/>
+              </a:spcBef>
+              <a:spcAft>
+                <a:spcPts val="0"/>
+              </a:spcAft>
+              <a:buNone/>
+            </a:pPr>
+            <a:r>
+              <a:rPr lang="en-GB" sz="2800" dirty="0">
+                <a:solidFill>
+                  <a:schemeClr val="lt1"/>
+                </a:solidFill>
+                <a:latin typeface="Times New Roman"/>
+                <a:ea typeface="Times New Roman"/>
+                <a:cs typeface="Times New Roman"/>
+                <a:sym typeface="Times New Roman"/>
+              </a:rPr>
+              <a:t>Contact Component</a:t>
+            </a:r>
+            <a:endParaRPr sz="2800" dirty="0">
+              <a:solidFill>
+                <a:schemeClr val="lt1"/>
+              </a:solidFill>
+              <a:latin typeface="Times New Roman"/>
+              <a:ea typeface="Times New Roman"/>
+              <a:cs typeface="Times New Roman"/>
+              <a:sym typeface="Times New Roman"/>
+            </a:endParaRPr>
+          </a:p>
+        </p:txBody>
+      </p:sp>
+    </p:spTree>
+    <p:extLst>
+      <p:ext uri="{BB962C8B-B14F-4D97-AF65-F5344CB8AC3E}">
+        <p14:creationId xmlns:p14="http://schemas.microsoft.com/office/powerpoint/2010/main" val="256898354"/>
+      </p:ext>
+    </p:extLst>
+  </p:cSld>
+  <p:clrMapOvr>
+    <a:masterClrMapping/>
+  </p:clrMapOvr>
+</p:sld>
+</file>
+
+<file path=ppt/slides/slide17.xml><?xml version="1.0" encoding="utf-8"?>
+<p:sld xmlns:a="http://schemas.openxmlformats.org/drawingml/2006/main" xmlns:r="http://schemas.openxmlformats.org/officeDocument/2006/relationships" xmlns:p="http://schemas.openxmlformats.org/presentationml/2006/main">
+  <p:cSld>
+    <p:spTree>
+      <p:nvGrpSpPr>
+        <p:cNvPr id="1" name="Shape 258"/>
+        <p:cNvGrpSpPr/>
+        <p:nvPr/>
+      </p:nvGrpSpPr>
+      <p:grpSpPr>
+        <a:xfrm>
+          <a:off x="0" y="0"/>
+          <a:ext cx="0" cy="0"/>
+          <a:chOff x="0" y="0"/>
+          <a:chExt cx="0" cy="0"/>
+        </a:xfrm>
+      </p:grpSpPr>
+      <p:sp>
+        <p:nvSpPr>
+          <p:cNvPr id="2" name="Google Shape;260;p37">
+            <a:extLst>
+              <a:ext uri="{FF2B5EF4-FFF2-40B4-BE49-F238E27FC236}">
+                <a16:creationId xmlns:a16="http://schemas.microsoft.com/office/drawing/2014/main" id="{1189F9CF-22EE-41C7-3065-8CD852B0E7CA}"/>
+              </a:ext>
+            </a:extLst>
+          </p:cNvPr>
+          <p:cNvSpPr/>
+          <p:nvPr/>
+        </p:nvSpPr>
+        <p:spPr>
+          <a:xfrm>
+            <a:off x="0" y="0"/>
+            <a:ext cx="4191000" cy="776817"/>
+          </a:xfrm>
+          <a:prstGeom prst="homePlate">
+            <a:avLst>
+              <a:gd name="adj" fmla="val 50000"/>
+            </a:avLst>
+          </a:prstGeom>
+          <a:gradFill>
+            <a:gsLst>
+              <a:gs pos="0">
+                <a:srgbClr val="E30000"/>
+              </a:gs>
+              <a:gs pos="100000">
+                <a:srgbClr val="760303"/>
+              </a:gs>
+            </a:gsLst>
+            <a:lin ang="0" scaled="0"/>
+          </a:gradFill>
+          <a:ln w="12700" cap="flat" cmpd="sng">
+            <a:solidFill>
+              <a:srgbClr val="42719B"/>
+            </a:solidFill>
+            <a:prstDash val="solid"/>
+            <a:miter lim="800000"/>
+            <a:headEnd type="none" w="sm" len="sm"/>
+            <a:tailEnd type="none" w="sm" len="sm"/>
+          </a:ln>
+        </p:spPr>
+        <p:txBody>
+          <a:bodyPr spcFirstLastPara="1" wrap="square" lIns="91425" tIns="45700" rIns="91425" bIns="45700" anchor="ctr" anchorCtr="0">
+            <a:noAutofit/>
+          </a:bodyPr>
+          <a:lstStyle/>
+          <a:p>
+            <a:pPr marL="0" marR="0" lvl="0" indent="0" algn="ctr" rtl="0">
+              <a:spcBef>
+                <a:spcPts val="0"/>
+              </a:spcBef>
+              <a:spcAft>
+                <a:spcPts val="0"/>
+              </a:spcAft>
+              <a:buNone/>
+            </a:pPr>
+            <a:r>
+              <a:rPr lang="en-GB" sz="2800" dirty="0">
+                <a:solidFill>
+                  <a:schemeClr val="lt1"/>
+                </a:solidFill>
+                <a:latin typeface="Times New Roman"/>
+                <a:ea typeface="Times New Roman"/>
+                <a:cs typeface="Times New Roman"/>
+                <a:sym typeface="Times New Roman"/>
+              </a:rPr>
+              <a:t>Contact Component</a:t>
+            </a:r>
+            <a:endParaRPr sz="2800" dirty="0">
+              <a:solidFill>
+                <a:schemeClr val="lt1"/>
+              </a:solidFill>
+              <a:latin typeface="Times New Roman"/>
+              <a:ea typeface="Times New Roman"/>
+              <a:cs typeface="Times New Roman"/>
+              <a:sym typeface="Times New Roman"/>
+            </a:endParaRPr>
+          </a:p>
+        </p:txBody>
+      </p:sp>
+      <p:pic>
+        <p:nvPicPr>
+          <p:cNvPr id="5" name="Picture 4" descr="A screenshot of a computer&#10;&#10;Description automatically generated">
+            <a:extLst>
+              <a:ext uri="{FF2B5EF4-FFF2-40B4-BE49-F238E27FC236}">
+                <a16:creationId xmlns:a16="http://schemas.microsoft.com/office/drawing/2014/main" id="{8DD5E8ED-9C53-ABEF-2255-090053E71B87}"/>
+              </a:ext>
+            </a:extLst>
+          </p:cNvPr>
+          <p:cNvPicPr>
+            <a:picLocks noChangeAspect="1"/>
+          </p:cNvPicPr>
+          <p:nvPr/>
+        </p:nvPicPr>
+        <p:blipFill>
+          <a:blip r:embed="rId3"/>
+          <a:stretch>
+            <a:fillRect/>
+          </a:stretch>
+        </p:blipFill>
+        <p:spPr>
+          <a:xfrm>
+            <a:off x="1" y="0"/>
+            <a:ext cx="12192000" cy="6858000"/>
+          </a:xfrm>
+          <a:prstGeom prst="rect">
+            <a:avLst/>
+          </a:prstGeom>
+        </p:spPr>
+      </p:pic>
+    </p:spTree>
+    <p:extLst>
+      <p:ext uri="{BB962C8B-B14F-4D97-AF65-F5344CB8AC3E}">
+        <p14:creationId xmlns:p14="http://schemas.microsoft.com/office/powerpoint/2010/main" val="4146011403"/>
+      </p:ext>
+    </p:extLst>
+  </p:cSld>
+  <p:clrMapOvr>
+    <a:masterClrMapping/>
+  </p:clrMapOvr>
+</p:sld>
+</file>
+
+<file path=ppt/slides/slide18.xml><?xml version="1.0" encoding="utf-8"?>
+<p:sld xmlns:a="http://schemas.openxmlformats.org/drawingml/2006/main" xmlns:r="http://schemas.openxmlformats.org/officeDocument/2006/relationships" xmlns:p="http://schemas.openxmlformats.org/presentationml/2006/main">
+  <p:cSld>
+    <p:spTree>
+      <p:nvGrpSpPr>
+        <p:cNvPr id="1" name="Shape 258"/>
+        <p:cNvGrpSpPr/>
+        <p:nvPr/>
+      </p:nvGrpSpPr>
+      <p:grpSpPr>
+        <a:xfrm>
+          <a:off x="0" y="0"/>
+          <a:ext cx="0" cy="0"/>
+          <a:chOff x="0" y="0"/>
+          <a:chExt cx="0" cy="0"/>
+        </a:xfrm>
+      </p:grpSpPr>
+      <p:sp>
+        <p:nvSpPr>
+          <p:cNvPr id="2" name="Google Shape;260;p37">
+            <a:extLst>
+              <a:ext uri="{FF2B5EF4-FFF2-40B4-BE49-F238E27FC236}">
+                <a16:creationId xmlns:a16="http://schemas.microsoft.com/office/drawing/2014/main" id="{1189F9CF-22EE-41C7-3065-8CD852B0E7CA}"/>
+              </a:ext>
+            </a:extLst>
+          </p:cNvPr>
+          <p:cNvSpPr/>
+          <p:nvPr/>
+        </p:nvSpPr>
+        <p:spPr>
+          <a:xfrm>
+            <a:off x="0" y="0"/>
+            <a:ext cx="4191000" cy="776817"/>
+          </a:xfrm>
+          <a:prstGeom prst="homePlate">
+            <a:avLst>
+              <a:gd name="adj" fmla="val 50000"/>
+            </a:avLst>
+          </a:prstGeom>
+          <a:gradFill>
+            <a:gsLst>
+              <a:gs pos="0">
+                <a:srgbClr val="E30000"/>
+              </a:gs>
+              <a:gs pos="100000">
+                <a:srgbClr val="760303"/>
+              </a:gs>
+            </a:gsLst>
+            <a:lin ang="0" scaled="0"/>
+          </a:gradFill>
+          <a:ln w="12700" cap="flat" cmpd="sng">
+            <a:solidFill>
+              <a:srgbClr val="42719B"/>
+            </a:solidFill>
+            <a:prstDash val="solid"/>
+            <a:miter lim="800000"/>
+            <a:headEnd type="none" w="sm" len="sm"/>
+            <a:tailEnd type="none" w="sm" len="sm"/>
+          </a:ln>
+        </p:spPr>
+        <p:txBody>
+          <a:bodyPr spcFirstLastPara="1" wrap="square" lIns="91425" tIns="45700" rIns="91425" bIns="45700" anchor="ctr" anchorCtr="0">
+            <a:noAutofit/>
+          </a:bodyPr>
+          <a:lstStyle/>
+          <a:p>
+            <a:pPr marL="0" marR="0" lvl="0" indent="0" algn="ctr" rtl="0">
+              <a:spcBef>
+                <a:spcPts val="0"/>
+              </a:spcBef>
+              <a:spcAft>
+                <a:spcPts val="0"/>
+              </a:spcAft>
+              <a:buNone/>
+            </a:pPr>
+            <a:r>
+              <a:rPr lang="en-GB" sz="2800" dirty="0">
+                <a:solidFill>
+                  <a:schemeClr val="lt1"/>
+                </a:solidFill>
+                <a:latin typeface="Times New Roman"/>
+                <a:ea typeface="Times New Roman"/>
+                <a:cs typeface="Times New Roman"/>
+                <a:sym typeface="Times New Roman"/>
+              </a:rPr>
+              <a:t>Club Fusion </a:t>
+            </a:r>
+            <a:endParaRPr sz="2800" dirty="0">
+              <a:solidFill>
+                <a:schemeClr val="lt1"/>
+              </a:solidFill>
+              <a:latin typeface="Times New Roman"/>
+              <a:ea typeface="Times New Roman"/>
+              <a:cs typeface="Times New Roman"/>
+              <a:sym typeface="Times New Roman"/>
+            </a:endParaRPr>
+          </a:p>
+        </p:txBody>
+      </p:sp>
+      <p:sp>
+        <p:nvSpPr>
+          <p:cNvPr id="5" name="TextBox 4">
+            <a:extLst>
+              <a:ext uri="{FF2B5EF4-FFF2-40B4-BE49-F238E27FC236}">
+                <a16:creationId xmlns:a16="http://schemas.microsoft.com/office/drawing/2014/main" id="{696964C7-07ED-B10E-1728-71DC5864B437}"/>
+              </a:ext>
+            </a:extLst>
+          </p:cNvPr>
+          <p:cNvSpPr txBox="1"/>
+          <p:nvPr/>
+        </p:nvSpPr>
+        <p:spPr>
+          <a:xfrm>
+            <a:off x="3047214" y="3277468"/>
+            <a:ext cx="6728381" cy="584775"/>
+          </a:xfrm>
+          <a:prstGeom prst="rect">
+            <a:avLst/>
+          </a:prstGeom>
+          <a:noFill/>
+        </p:spPr>
+        <p:txBody>
+          <a:bodyPr wrap="square">
+            <a:spAutoFit/>
+          </a:bodyPr>
+          <a:lstStyle/>
+          <a:p>
+            <a:r>
+              <a:rPr lang="en-001" sz="3200" dirty="0">
+                <a:hlinkClick r:id="rId3"/>
+              </a:rPr>
+              <a:t>https://mru-clubs.vercel.app/</a:t>
+            </a:r>
+            <a:endParaRPr lang="en-001" sz="3200" dirty="0"/>
+          </a:p>
+        </p:txBody>
+      </p:sp>
+    </p:spTree>
+    <p:extLst>
+      <p:ext uri="{BB962C8B-B14F-4D97-AF65-F5344CB8AC3E}">
+        <p14:creationId xmlns:p14="http://schemas.microsoft.com/office/powerpoint/2010/main" val="3022406481"/>
+      </p:ext>
+    </p:extLst>
+  </p:cSld>
+  <p:clrMapOvr>
+    <a:masterClrMapping/>
+  </p:clrMapOvr>
+</p:sld>
+</file>
+
+<file path=ppt/slides/slide19.xml><?xml version="1.0" encoding="utf-8"?>
+<p:sld xmlns:a="http://schemas.openxmlformats.org/drawingml/2006/main" xmlns:r="http://schemas.openxmlformats.org/officeDocument/2006/relationships" xmlns:p="http://schemas.openxmlformats.org/presentationml/2006/main">
+  <p:cSld>
+    <p:spTree>
+      <p:nvGrpSpPr>
         <p:cNvPr id="1" name="Shape 251"/>
         <p:cNvGrpSpPr/>
         <p:nvPr/>
@@ -13902,7 +16177,565 @@
 </p:sld>
 </file>
 
-<file path=ppt/slides/slide11.xml><?xml version="1.0" encoding="utf-8"?>
+<file path=ppt/slides/slide2.xml><?xml version="1.0" encoding="utf-8"?>
+<p:sld xmlns:a="http://schemas.openxmlformats.org/drawingml/2006/main" xmlns:r="http://schemas.openxmlformats.org/officeDocument/2006/relationships" xmlns:p="http://schemas.openxmlformats.org/presentationml/2006/main">
+  <p:cSld>
+    <p:spTree>
+      <p:nvGrpSpPr>
+        <p:cNvPr id="1" name="Shape 95"/>
+        <p:cNvGrpSpPr/>
+        <p:nvPr/>
+      </p:nvGrpSpPr>
+      <p:grpSpPr>
+        <a:xfrm>
+          <a:off x="0" y="0"/>
+          <a:ext cx="0" cy="0"/>
+          <a:chOff x="0" y="0"/>
+          <a:chExt cx="0" cy="0"/>
+        </a:xfrm>
+      </p:grpSpPr>
+      <p:sp>
+        <p:nvSpPr>
+          <p:cNvPr id="96" name="Google Shape;96;p14"/>
+          <p:cNvSpPr txBox="1">
+            <a:spLocks noGrp="1"/>
+          </p:cNvSpPr>
+          <p:nvPr>
+            <p:ph type="body" idx="1"/>
+          </p:nvPr>
+        </p:nvSpPr>
+        <p:spPr>
+          <a:xfrm>
+            <a:off x="511800" y="1124625"/>
+            <a:ext cx="10776000" cy="5577300"/>
+          </a:xfrm>
+          <a:prstGeom prst="rect">
+            <a:avLst/>
+          </a:prstGeom>
+          <a:noFill/>
+          <a:ln>
+            <a:noFill/>
+          </a:ln>
+        </p:spPr>
+        <p:txBody>
+          <a:bodyPr spcFirstLastPara="1" wrap="square" lIns="91425" tIns="45700" rIns="91425" bIns="45700" anchor="t" anchorCtr="0">
+            <a:normAutofit fontScale="85000" lnSpcReduction="20000"/>
+          </a:bodyPr>
+          <a:lstStyle/>
+          <a:p>
+            <a:pPr marL="457200" lvl="0" indent="0" algn="l" rtl="0">
+              <a:lnSpc>
+                <a:spcPct val="150000"/>
+              </a:lnSpc>
+              <a:spcBef>
+                <a:spcPts val="0"/>
+              </a:spcBef>
+              <a:spcAft>
+                <a:spcPts val="0"/>
+              </a:spcAft>
+              <a:buNone/>
+            </a:pPr>
+            <a:endParaRPr sz="3200" b="1" dirty="0">
+              <a:solidFill>
+                <a:srgbClr val="292934"/>
+              </a:solidFill>
+              <a:latin typeface="Times New Roman"/>
+              <a:ea typeface="Times New Roman"/>
+              <a:cs typeface="Times New Roman"/>
+              <a:sym typeface="Times New Roman"/>
+            </a:endParaRPr>
+          </a:p>
+          <a:p>
+            <a:pPr marL="342900" lvl="0" indent="-253206" algn="l" rtl="0">
+              <a:lnSpc>
+                <a:spcPct val="150000"/>
+              </a:lnSpc>
+              <a:spcBef>
+                <a:spcPts val="0"/>
+              </a:spcBef>
+              <a:spcAft>
+                <a:spcPts val="0"/>
+              </a:spcAft>
+              <a:buClr>
+                <a:srgbClr val="292934"/>
+              </a:buClr>
+              <a:buSzPct val="100000"/>
+              <a:buFont typeface="Times New Roman"/>
+              <a:buChar char="•"/>
+            </a:pPr>
+            <a:r>
+              <a:rPr lang="en-US" sz="3600" b="1" dirty="0">
+                <a:solidFill>
+                  <a:srgbClr val="292934"/>
+                </a:solidFill>
+                <a:latin typeface="Times New Roman"/>
+                <a:ea typeface="Times New Roman"/>
+                <a:cs typeface="Times New Roman"/>
+                <a:sym typeface="Times New Roman"/>
+              </a:rPr>
+              <a:t>Title Explanation</a:t>
+            </a:r>
+            <a:endParaRPr sz="3600" dirty="0">
+              <a:latin typeface="Times New Roman"/>
+              <a:ea typeface="Times New Roman"/>
+              <a:cs typeface="Times New Roman"/>
+              <a:sym typeface="Times New Roman"/>
+            </a:endParaRPr>
+          </a:p>
+          <a:p>
+            <a:pPr marL="342900" lvl="0" indent="-253206" algn="l" rtl="0">
+              <a:lnSpc>
+                <a:spcPct val="150000"/>
+              </a:lnSpc>
+              <a:spcBef>
+                <a:spcPts val="0"/>
+              </a:spcBef>
+              <a:spcAft>
+                <a:spcPts val="0"/>
+              </a:spcAft>
+              <a:buClr>
+                <a:srgbClr val="292934"/>
+              </a:buClr>
+              <a:buSzPct val="100000"/>
+              <a:buFont typeface="Times New Roman"/>
+              <a:buChar char="•"/>
+            </a:pPr>
+            <a:r>
+              <a:rPr lang="en-US" sz="3600" b="1" dirty="0">
+                <a:solidFill>
+                  <a:srgbClr val="292934"/>
+                </a:solidFill>
+                <a:latin typeface="Times New Roman"/>
+                <a:ea typeface="Times New Roman"/>
+                <a:cs typeface="Times New Roman"/>
+                <a:sym typeface="Times New Roman"/>
+              </a:rPr>
+              <a:t>Abstract of the Application</a:t>
+            </a:r>
+            <a:endParaRPr sz="3600" dirty="0">
+              <a:latin typeface="Times New Roman"/>
+              <a:ea typeface="Times New Roman"/>
+              <a:cs typeface="Times New Roman"/>
+              <a:sym typeface="Times New Roman"/>
+            </a:endParaRPr>
+          </a:p>
+          <a:p>
+            <a:pPr marL="342900" lvl="0" indent="-253206" algn="l" rtl="0">
+              <a:lnSpc>
+                <a:spcPct val="150000"/>
+              </a:lnSpc>
+              <a:spcBef>
+                <a:spcPts val="0"/>
+              </a:spcBef>
+              <a:spcAft>
+                <a:spcPts val="0"/>
+              </a:spcAft>
+              <a:buClr>
+                <a:srgbClr val="292934"/>
+              </a:buClr>
+              <a:buSzPct val="100000"/>
+              <a:buFont typeface="Times New Roman"/>
+              <a:buChar char="•"/>
+            </a:pPr>
+            <a:r>
+              <a:rPr lang="en-US" sz="3600" b="1" dirty="0">
+                <a:solidFill>
+                  <a:srgbClr val="292934"/>
+                </a:solidFill>
+                <a:latin typeface="Times New Roman"/>
+                <a:ea typeface="Times New Roman"/>
+                <a:cs typeface="Times New Roman"/>
+                <a:sym typeface="Times New Roman"/>
+              </a:rPr>
+              <a:t>Introduction to the Application</a:t>
+            </a:r>
+            <a:endParaRPr sz="3600" b="1" dirty="0">
+              <a:solidFill>
+                <a:srgbClr val="292934"/>
+              </a:solidFill>
+              <a:latin typeface="Times New Roman"/>
+              <a:ea typeface="Times New Roman"/>
+              <a:cs typeface="Times New Roman"/>
+              <a:sym typeface="Times New Roman"/>
+            </a:endParaRPr>
+          </a:p>
+          <a:p>
+            <a:pPr marL="342900" lvl="0" indent="-253206" algn="l" rtl="0">
+              <a:lnSpc>
+                <a:spcPct val="150000"/>
+              </a:lnSpc>
+              <a:spcBef>
+                <a:spcPts val="0"/>
+              </a:spcBef>
+              <a:spcAft>
+                <a:spcPts val="0"/>
+              </a:spcAft>
+              <a:buClr>
+                <a:srgbClr val="292934"/>
+              </a:buClr>
+              <a:buSzPct val="100000"/>
+              <a:buFont typeface="Times New Roman"/>
+              <a:buChar char="•"/>
+            </a:pPr>
+            <a:r>
+              <a:rPr lang="en-US" sz="3600" b="1" dirty="0">
+                <a:solidFill>
+                  <a:srgbClr val="292934"/>
+                </a:solidFill>
+                <a:latin typeface="Times New Roman"/>
+                <a:ea typeface="Times New Roman"/>
+                <a:cs typeface="Times New Roman"/>
+                <a:sym typeface="Times New Roman"/>
+              </a:rPr>
+              <a:t>Existing System</a:t>
+            </a:r>
+          </a:p>
+          <a:p>
+            <a:pPr marL="342900" lvl="0" indent="-253206" algn="l" rtl="0">
+              <a:lnSpc>
+                <a:spcPct val="150000"/>
+              </a:lnSpc>
+              <a:spcBef>
+                <a:spcPts val="0"/>
+              </a:spcBef>
+              <a:spcAft>
+                <a:spcPts val="0"/>
+              </a:spcAft>
+              <a:buClr>
+                <a:srgbClr val="292934"/>
+              </a:buClr>
+              <a:buSzPct val="100000"/>
+              <a:buFont typeface="Times New Roman"/>
+              <a:buChar char="•"/>
+            </a:pPr>
+            <a:r>
+              <a:rPr lang="en-US" sz="3600" b="1" dirty="0">
+                <a:solidFill>
+                  <a:srgbClr val="292934"/>
+                </a:solidFill>
+                <a:latin typeface="Times New Roman"/>
+                <a:ea typeface="Times New Roman"/>
+                <a:cs typeface="Times New Roman"/>
+                <a:sym typeface="Times New Roman"/>
+              </a:rPr>
+              <a:t>Proposed System </a:t>
+            </a:r>
+          </a:p>
+          <a:p>
+            <a:pPr marL="342900" lvl="0" indent="-253206" algn="l" rtl="0">
+              <a:lnSpc>
+                <a:spcPct val="150000"/>
+              </a:lnSpc>
+              <a:spcBef>
+                <a:spcPts val="0"/>
+              </a:spcBef>
+              <a:spcAft>
+                <a:spcPts val="0"/>
+              </a:spcAft>
+              <a:buClr>
+                <a:srgbClr val="292934"/>
+              </a:buClr>
+              <a:buSzPct val="100000"/>
+              <a:buFont typeface="Times New Roman"/>
+              <a:buChar char="•"/>
+            </a:pPr>
+            <a:r>
+              <a:rPr lang="en-US" sz="3600" b="1" dirty="0">
+                <a:solidFill>
+                  <a:srgbClr val="292934"/>
+                </a:solidFill>
+                <a:latin typeface="Times New Roman"/>
+                <a:ea typeface="Times New Roman"/>
+                <a:cs typeface="Times New Roman"/>
+                <a:sym typeface="Times New Roman"/>
+              </a:rPr>
+              <a:t>Tech Stack</a:t>
+            </a:r>
+            <a:endParaRPr sz="3600" b="1" dirty="0">
+              <a:solidFill>
+                <a:srgbClr val="292934"/>
+              </a:solidFill>
+              <a:latin typeface="Times New Roman"/>
+              <a:ea typeface="Times New Roman"/>
+              <a:cs typeface="Times New Roman"/>
+              <a:sym typeface="Times New Roman"/>
+            </a:endParaRPr>
+          </a:p>
+          <a:p>
+            <a:pPr marL="342900" lvl="0" indent="-253206" algn="l" rtl="0">
+              <a:lnSpc>
+                <a:spcPct val="150000"/>
+              </a:lnSpc>
+              <a:spcBef>
+                <a:spcPts val="0"/>
+              </a:spcBef>
+              <a:spcAft>
+                <a:spcPts val="0"/>
+              </a:spcAft>
+              <a:buClr>
+                <a:srgbClr val="292934"/>
+              </a:buClr>
+              <a:buSzPct val="100000"/>
+              <a:buFont typeface="Times New Roman"/>
+              <a:buChar char="•"/>
+            </a:pPr>
+            <a:r>
+              <a:rPr lang="en-US" sz="3600" b="1" dirty="0">
+                <a:solidFill>
+                  <a:srgbClr val="292934"/>
+                </a:solidFill>
+                <a:latin typeface="Times New Roman"/>
+                <a:ea typeface="Times New Roman"/>
+                <a:cs typeface="Times New Roman"/>
+                <a:sym typeface="Times New Roman"/>
+              </a:rPr>
+              <a:t>Conclusion </a:t>
+            </a:r>
+            <a:endParaRPr sz="3600" b="1" dirty="0">
+              <a:solidFill>
+                <a:srgbClr val="292934"/>
+              </a:solidFill>
+              <a:latin typeface="Times New Roman"/>
+              <a:ea typeface="Times New Roman"/>
+              <a:cs typeface="Times New Roman"/>
+              <a:sym typeface="Times New Roman"/>
+            </a:endParaRPr>
+          </a:p>
+          <a:p>
+            <a:pPr marL="342900" lvl="0" indent="-253206" algn="l" rtl="0">
+              <a:lnSpc>
+                <a:spcPct val="150000"/>
+              </a:lnSpc>
+              <a:spcBef>
+                <a:spcPts val="0"/>
+              </a:spcBef>
+              <a:spcAft>
+                <a:spcPts val="0"/>
+              </a:spcAft>
+              <a:buClr>
+                <a:srgbClr val="292934"/>
+              </a:buClr>
+              <a:buSzPct val="100000"/>
+              <a:buFont typeface="Times New Roman"/>
+              <a:buChar char="•"/>
+            </a:pPr>
+            <a:r>
+              <a:rPr lang="en-US" sz="3600" b="1" dirty="0">
+                <a:solidFill>
+                  <a:srgbClr val="292934"/>
+                </a:solidFill>
+                <a:latin typeface="Times New Roman"/>
+                <a:ea typeface="Times New Roman"/>
+                <a:cs typeface="Times New Roman"/>
+                <a:sym typeface="Times New Roman"/>
+              </a:rPr>
+              <a:t>Future Scope</a:t>
+            </a:r>
+            <a:endParaRPr sz="3600" b="1" dirty="0">
+              <a:solidFill>
+                <a:srgbClr val="292934"/>
+              </a:solidFill>
+              <a:latin typeface="Times New Roman"/>
+              <a:ea typeface="Times New Roman"/>
+              <a:cs typeface="Times New Roman"/>
+              <a:sym typeface="Times New Roman"/>
+            </a:endParaRPr>
+          </a:p>
+          <a:p>
+            <a:pPr marL="0" lvl="0" indent="0" algn="l" rtl="0">
+              <a:lnSpc>
+                <a:spcPct val="100000"/>
+              </a:lnSpc>
+              <a:spcBef>
+                <a:spcPts val="0"/>
+              </a:spcBef>
+              <a:spcAft>
+                <a:spcPts val="0"/>
+              </a:spcAft>
+              <a:buClr>
+                <a:schemeClr val="dk1"/>
+              </a:buClr>
+              <a:buFont typeface="Arial"/>
+              <a:buNone/>
+            </a:pPr>
+            <a:endParaRPr sz="1800" dirty="0">
+              <a:solidFill>
+                <a:srgbClr val="292934"/>
+              </a:solidFill>
+              <a:latin typeface="Arial"/>
+              <a:ea typeface="Arial"/>
+              <a:cs typeface="Arial"/>
+              <a:sym typeface="Arial"/>
+            </a:endParaRPr>
+          </a:p>
+          <a:p>
+            <a:pPr marL="228600" lvl="0" indent="-86360" algn="l" rtl="0">
+              <a:lnSpc>
+                <a:spcPct val="100000"/>
+              </a:lnSpc>
+              <a:spcBef>
+                <a:spcPts val="1000"/>
+              </a:spcBef>
+              <a:spcAft>
+                <a:spcPts val="0"/>
+              </a:spcAft>
+              <a:buClr>
+                <a:schemeClr val="dk1"/>
+              </a:buClr>
+              <a:buSzPct val="100000"/>
+              <a:buNone/>
+            </a:pPr>
+            <a:endParaRPr dirty="0">
+              <a:latin typeface="Times New Roman"/>
+              <a:ea typeface="Times New Roman"/>
+              <a:cs typeface="Times New Roman"/>
+              <a:sym typeface="Times New Roman"/>
+            </a:endParaRPr>
+          </a:p>
+        </p:txBody>
+      </p:sp>
+      <p:sp>
+        <p:nvSpPr>
+          <p:cNvPr id="97" name="Google Shape;97;p14"/>
+          <p:cNvSpPr/>
+          <p:nvPr/>
+        </p:nvSpPr>
+        <p:spPr>
+          <a:xfrm>
+            <a:off x="14605" y="-5080"/>
+            <a:ext cx="7230000" cy="1003800"/>
+          </a:xfrm>
+          <a:prstGeom prst="homePlate">
+            <a:avLst>
+              <a:gd name="adj" fmla="val 50000"/>
+            </a:avLst>
+          </a:prstGeom>
+          <a:gradFill>
+            <a:gsLst>
+              <a:gs pos="0">
+                <a:srgbClr val="E30000"/>
+              </a:gs>
+              <a:gs pos="100000">
+                <a:srgbClr val="760303"/>
+              </a:gs>
+            </a:gsLst>
+            <a:lin ang="0" scaled="0"/>
+          </a:gradFill>
+          <a:ln w="12700" cap="flat" cmpd="sng">
+            <a:solidFill>
+              <a:srgbClr val="42719B"/>
+            </a:solidFill>
+            <a:prstDash val="solid"/>
+            <a:miter lim="800000"/>
+            <a:headEnd type="none" w="sm" len="sm"/>
+            <a:tailEnd type="none" w="sm" len="sm"/>
+          </a:ln>
+        </p:spPr>
+        <p:txBody>
+          <a:bodyPr spcFirstLastPara="1" wrap="square" lIns="91425" tIns="45700" rIns="91425" bIns="45700" anchor="ctr" anchorCtr="0">
+            <a:noAutofit/>
+          </a:bodyPr>
+          <a:lstStyle/>
+          <a:p>
+            <a:pPr marL="0" marR="0" lvl="0" indent="0" algn="ctr" rtl="0">
+              <a:spcBef>
+                <a:spcPts val="0"/>
+              </a:spcBef>
+              <a:spcAft>
+                <a:spcPts val="0"/>
+              </a:spcAft>
+              <a:buNone/>
+            </a:pPr>
+            <a:endParaRPr sz="1800" b="0" i="0" u="none" strike="noStrike" cap="none">
+              <a:solidFill>
+                <a:schemeClr val="lt1"/>
+              </a:solidFill>
+              <a:highlight>
+                <a:srgbClr val="FF0000"/>
+              </a:highlight>
+              <a:latin typeface="Calibri"/>
+              <a:ea typeface="Calibri"/>
+              <a:cs typeface="Calibri"/>
+              <a:sym typeface="Calibri"/>
+            </a:endParaRPr>
+          </a:p>
+        </p:txBody>
+      </p:sp>
+      <p:sp>
+        <p:nvSpPr>
+          <p:cNvPr id="98" name="Google Shape;98;p14"/>
+          <p:cNvSpPr/>
+          <p:nvPr/>
+        </p:nvSpPr>
+        <p:spPr>
+          <a:xfrm>
+            <a:off x="232410" y="107950"/>
+            <a:ext cx="7707600" cy="891600"/>
+          </a:xfrm>
+          <a:prstGeom prst="rect">
+            <a:avLst/>
+          </a:prstGeom>
+          <a:noFill/>
+          <a:ln>
+            <a:noFill/>
+          </a:ln>
+        </p:spPr>
+        <p:txBody>
+          <a:bodyPr spcFirstLastPara="1" wrap="square" lIns="91425" tIns="45700" rIns="91425" bIns="45700" anchor="ctr" anchorCtr="0">
+            <a:noAutofit/>
+          </a:bodyPr>
+          <a:lstStyle/>
+          <a:p>
+            <a:pPr marL="0" marR="0" lvl="0" indent="0" algn="l" rtl="0">
+              <a:lnSpc>
+                <a:spcPct val="90000"/>
+              </a:lnSpc>
+              <a:spcBef>
+                <a:spcPts val="0"/>
+              </a:spcBef>
+              <a:spcAft>
+                <a:spcPts val="0"/>
+              </a:spcAft>
+              <a:buClr>
+                <a:schemeClr val="lt1"/>
+              </a:buClr>
+              <a:buSzPts val="4000"/>
+              <a:buFont typeface="Times New Roman"/>
+              <a:buNone/>
+            </a:pPr>
+            <a:r>
+              <a:rPr lang="en-US" sz="4000" b="1">
+                <a:solidFill>
+                  <a:schemeClr val="lt1"/>
+                </a:solidFill>
+                <a:latin typeface="Times New Roman"/>
+                <a:ea typeface="Times New Roman"/>
+                <a:cs typeface="Times New Roman"/>
+                <a:sym typeface="Times New Roman"/>
+              </a:rPr>
+              <a:t>Contents of the Presentation</a:t>
+            </a:r>
+            <a:endParaRPr sz="3200" b="1" i="0" u="none" strike="noStrike" cap="none">
+              <a:solidFill>
+                <a:schemeClr val="lt1"/>
+              </a:solidFill>
+              <a:latin typeface="Times New Roman"/>
+              <a:ea typeface="Times New Roman"/>
+              <a:cs typeface="Times New Roman"/>
+              <a:sym typeface="Times New Roman"/>
+            </a:endParaRPr>
+          </a:p>
+        </p:txBody>
+      </p:sp>
+    </p:spTree>
+  </p:cSld>
+  <p:clrMapOvr>
+    <a:masterClrMapping/>
+  </p:clrMapOvr>
+</p:sld>
+</file>
+
+<file path=ppt/slides/slide20.xml><?xml version="1.0" encoding="utf-8"?>
 <p:sld xmlns:a="http://schemas.openxmlformats.org/drawingml/2006/main" xmlns:r="http://schemas.openxmlformats.org/officeDocument/2006/relationships" xmlns:p="http://schemas.openxmlformats.org/presentationml/2006/main">
   <p:cSld>
     <p:spTree>
@@ -14313,7 +17146,7 @@
 </p:sld>
 </file>
 
-<file path=ppt/slides/slide12.xml><?xml version="1.0" encoding="utf-8"?>
+<file path=ppt/slides/slide21.xml><?xml version="1.0" encoding="utf-8"?>
 <p:sld xmlns:a="http://schemas.openxmlformats.org/drawingml/2006/main" xmlns:r="http://schemas.openxmlformats.org/officeDocument/2006/relationships" xmlns:p="http://schemas.openxmlformats.org/presentationml/2006/main">
   <p:cSld>
     <p:spTree>
@@ -14448,564 +17281,6 @@
           <a:p>
             <a:pPr algn="ctr"/>
             <a:endParaRPr lang="en-US"/>
-          </a:p>
-        </p:txBody>
-      </p:sp>
-    </p:spTree>
-  </p:cSld>
-  <p:clrMapOvr>
-    <a:masterClrMapping/>
-  </p:clrMapOvr>
-</p:sld>
-</file>
-
-<file path=ppt/slides/slide2.xml><?xml version="1.0" encoding="utf-8"?>
-<p:sld xmlns:a="http://schemas.openxmlformats.org/drawingml/2006/main" xmlns:r="http://schemas.openxmlformats.org/officeDocument/2006/relationships" xmlns:p="http://schemas.openxmlformats.org/presentationml/2006/main">
-  <p:cSld>
-    <p:spTree>
-      <p:nvGrpSpPr>
-        <p:cNvPr id="1" name="Shape 95"/>
-        <p:cNvGrpSpPr/>
-        <p:nvPr/>
-      </p:nvGrpSpPr>
-      <p:grpSpPr>
-        <a:xfrm>
-          <a:off x="0" y="0"/>
-          <a:ext cx="0" cy="0"/>
-          <a:chOff x="0" y="0"/>
-          <a:chExt cx="0" cy="0"/>
-        </a:xfrm>
-      </p:grpSpPr>
-      <p:sp>
-        <p:nvSpPr>
-          <p:cNvPr id="96" name="Google Shape;96;p14"/>
-          <p:cNvSpPr txBox="1">
-            <a:spLocks noGrp="1"/>
-          </p:cNvSpPr>
-          <p:nvPr>
-            <p:ph type="body" idx="1"/>
-          </p:nvPr>
-        </p:nvSpPr>
-        <p:spPr>
-          <a:xfrm>
-            <a:off x="511800" y="1124625"/>
-            <a:ext cx="10776000" cy="5577300"/>
-          </a:xfrm>
-          <a:prstGeom prst="rect">
-            <a:avLst/>
-          </a:prstGeom>
-          <a:noFill/>
-          <a:ln>
-            <a:noFill/>
-          </a:ln>
-        </p:spPr>
-        <p:txBody>
-          <a:bodyPr spcFirstLastPara="1" wrap="square" lIns="91425" tIns="45700" rIns="91425" bIns="45700" anchor="t" anchorCtr="0">
-            <a:normAutofit fontScale="85000" lnSpcReduction="20000"/>
-          </a:bodyPr>
-          <a:lstStyle/>
-          <a:p>
-            <a:pPr marL="457200" lvl="0" indent="0" algn="l" rtl="0">
-              <a:lnSpc>
-                <a:spcPct val="150000"/>
-              </a:lnSpc>
-              <a:spcBef>
-                <a:spcPts val="0"/>
-              </a:spcBef>
-              <a:spcAft>
-                <a:spcPts val="0"/>
-              </a:spcAft>
-              <a:buNone/>
-            </a:pPr>
-            <a:endParaRPr sz="3200" b="1" dirty="0">
-              <a:solidFill>
-                <a:srgbClr val="292934"/>
-              </a:solidFill>
-              <a:latin typeface="Times New Roman"/>
-              <a:ea typeface="Times New Roman"/>
-              <a:cs typeface="Times New Roman"/>
-              <a:sym typeface="Times New Roman"/>
-            </a:endParaRPr>
-          </a:p>
-          <a:p>
-            <a:pPr marL="342900" lvl="0" indent="-253206" algn="l" rtl="0">
-              <a:lnSpc>
-                <a:spcPct val="150000"/>
-              </a:lnSpc>
-              <a:spcBef>
-                <a:spcPts val="0"/>
-              </a:spcBef>
-              <a:spcAft>
-                <a:spcPts val="0"/>
-              </a:spcAft>
-              <a:buClr>
-                <a:srgbClr val="292934"/>
-              </a:buClr>
-              <a:buSzPct val="100000"/>
-              <a:buFont typeface="Times New Roman"/>
-              <a:buChar char="•"/>
-            </a:pPr>
-            <a:r>
-              <a:rPr lang="en-US" sz="3600" b="1" dirty="0">
-                <a:solidFill>
-                  <a:srgbClr val="292934"/>
-                </a:solidFill>
-                <a:latin typeface="Times New Roman"/>
-                <a:ea typeface="Times New Roman"/>
-                <a:cs typeface="Times New Roman"/>
-                <a:sym typeface="Times New Roman"/>
-              </a:rPr>
-              <a:t>Title Explanation</a:t>
-            </a:r>
-            <a:endParaRPr sz="3600" dirty="0">
-              <a:latin typeface="Times New Roman"/>
-              <a:ea typeface="Times New Roman"/>
-              <a:cs typeface="Times New Roman"/>
-              <a:sym typeface="Times New Roman"/>
-            </a:endParaRPr>
-          </a:p>
-          <a:p>
-            <a:pPr marL="342900" lvl="0" indent="-253206" algn="l" rtl="0">
-              <a:lnSpc>
-                <a:spcPct val="150000"/>
-              </a:lnSpc>
-              <a:spcBef>
-                <a:spcPts val="0"/>
-              </a:spcBef>
-              <a:spcAft>
-                <a:spcPts val="0"/>
-              </a:spcAft>
-              <a:buClr>
-                <a:srgbClr val="292934"/>
-              </a:buClr>
-              <a:buSzPct val="100000"/>
-              <a:buFont typeface="Times New Roman"/>
-              <a:buChar char="•"/>
-            </a:pPr>
-            <a:r>
-              <a:rPr lang="en-US" sz="3600" b="1" dirty="0">
-                <a:solidFill>
-                  <a:srgbClr val="292934"/>
-                </a:solidFill>
-                <a:latin typeface="Times New Roman"/>
-                <a:ea typeface="Times New Roman"/>
-                <a:cs typeface="Times New Roman"/>
-                <a:sym typeface="Times New Roman"/>
-              </a:rPr>
-              <a:t>Abstract of the Application</a:t>
-            </a:r>
-            <a:endParaRPr sz="3600" dirty="0">
-              <a:latin typeface="Times New Roman"/>
-              <a:ea typeface="Times New Roman"/>
-              <a:cs typeface="Times New Roman"/>
-              <a:sym typeface="Times New Roman"/>
-            </a:endParaRPr>
-          </a:p>
-          <a:p>
-            <a:pPr marL="342900" lvl="0" indent="-253206" algn="l" rtl="0">
-              <a:lnSpc>
-                <a:spcPct val="150000"/>
-              </a:lnSpc>
-              <a:spcBef>
-                <a:spcPts val="0"/>
-              </a:spcBef>
-              <a:spcAft>
-                <a:spcPts val="0"/>
-              </a:spcAft>
-              <a:buClr>
-                <a:srgbClr val="292934"/>
-              </a:buClr>
-              <a:buSzPct val="100000"/>
-              <a:buFont typeface="Times New Roman"/>
-              <a:buChar char="•"/>
-            </a:pPr>
-            <a:r>
-              <a:rPr lang="en-US" sz="3600" b="1" dirty="0">
-                <a:solidFill>
-                  <a:srgbClr val="292934"/>
-                </a:solidFill>
-                <a:latin typeface="Times New Roman"/>
-                <a:ea typeface="Times New Roman"/>
-                <a:cs typeface="Times New Roman"/>
-                <a:sym typeface="Times New Roman"/>
-              </a:rPr>
-              <a:t>Introduction to the Application</a:t>
-            </a:r>
-            <a:endParaRPr sz="3600" b="1" dirty="0">
-              <a:solidFill>
-                <a:srgbClr val="292934"/>
-              </a:solidFill>
-              <a:latin typeface="Times New Roman"/>
-              <a:ea typeface="Times New Roman"/>
-              <a:cs typeface="Times New Roman"/>
-              <a:sym typeface="Times New Roman"/>
-            </a:endParaRPr>
-          </a:p>
-          <a:p>
-            <a:pPr marL="342900" lvl="0" indent="-253206" algn="l" rtl="0">
-              <a:lnSpc>
-                <a:spcPct val="150000"/>
-              </a:lnSpc>
-              <a:spcBef>
-                <a:spcPts val="0"/>
-              </a:spcBef>
-              <a:spcAft>
-                <a:spcPts val="0"/>
-              </a:spcAft>
-              <a:buClr>
-                <a:srgbClr val="292934"/>
-              </a:buClr>
-              <a:buSzPct val="100000"/>
-              <a:buFont typeface="Times New Roman"/>
-              <a:buChar char="•"/>
-            </a:pPr>
-            <a:r>
-              <a:rPr lang="en-US" sz="3600" b="1" dirty="0">
-                <a:solidFill>
-                  <a:srgbClr val="292934"/>
-                </a:solidFill>
-                <a:latin typeface="Times New Roman"/>
-                <a:ea typeface="Times New Roman"/>
-                <a:cs typeface="Times New Roman"/>
-                <a:sym typeface="Times New Roman"/>
-              </a:rPr>
-              <a:t>Existing System</a:t>
-            </a:r>
-          </a:p>
-          <a:p>
-            <a:pPr marL="342900" lvl="0" indent="-253206" algn="l" rtl="0">
-              <a:lnSpc>
-                <a:spcPct val="150000"/>
-              </a:lnSpc>
-              <a:spcBef>
-                <a:spcPts val="0"/>
-              </a:spcBef>
-              <a:spcAft>
-                <a:spcPts val="0"/>
-              </a:spcAft>
-              <a:buClr>
-                <a:srgbClr val="292934"/>
-              </a:buClr>
-              <a:buSzPct val="100000"/>
-              <a:buFont typeface="Times New Roman"/>
-              <a:buChar char="•"/>
-            </a:pPr>
-            <a:r>
-              <a:rPr lang="en-US" sz="3600" b="1" dirty="0">
-                <a:solidFill>
-                  <a:srgbClr val="292934"/>
-                </a:solidFill>
-                <a:latin typeface="Times New Roman"/>
-                <a:ea typeface="Times New Roman"/>
-                <a:cs typeface="Times New Roman"/>
-                <a:sym typeface="Times New Roman"/>
-              </a:rPr>
-              <a:t>Proposed System </a:t>
-            </a:r>
-          </a:p>
-          <a:p>
-            <a:pPr marL="342900" lvl="0" indent="-253206" algn="l" rtl="0">
-              <a:lnSpc>
-                <a:spcPct val="150000"/>
-              </a:lnSpc>
-              <a:spcBef>
-                <a:spcPts val="0"/>
-              </a:spcBef>
-              <a:spcAft>
-                <a:spcPts val="0"/>
-              </a:spcAft>
-              <a:buClr>
-                <a:srgbClr val="292934"/>
-              </a:buClr>
-              <a:buSzPct val="100000"/>
-              <a:buFont typeface="Times New Roman"/>
-              <a:buChar char="•"/>
-            </a:pPr>
-            <a:r>
-              <a:rPr lang="en-US" sz="3600" b="1" dirty="0">
-                <a:solidFill>
-                  <a:srgbClr val="292934"/>
-                </a:solidFill>
-                <a:latin typeface="Times New Roman"/>
-                <a:ea typeface="Times New Roman"/>
-                <a:cs typeface="Times New Roman"/>
-                <a:sym typeface="Times New Roman"/>
-              </a:rPr>
-              <a:t>Tech Stack</a:t>
-            </a:r>
-            <a:endParaRPr sz="3600" b="1" dirty="0">
-              <a:solidFill>
-                <a:srgbClr val="292934"/>
-              </a:solidFill>
-              <a:latin typeface="Times New Roman"/>
-              <a:ea typeface="Times New Roman"/>
-              <a:cs typeface="Times New Roman"/>
-              <a:sym typeface="Times New Roman"/>
-            </a:endParaRPr>
-          </a:p>
-          <a:p>
-            <a:pPr marL="342900" lvl="0" indent="-253206" algn="l" rtl="0">
-              <a:lnSpc>
-                <a:spcPct val="150000"/>
-              </a:lnSpc>
-              <a:spcBef>
-                <a:spcPts val="0"/>
-              </a:spcBef>
-              <a:spcAft>
-                <a:spcPts val="0"/>
-              </a:spcAft>
-              <a:buClr>
-                <a:srgbClr val="292934"/>
-              </a:buClr>
-              <a:buSzPct val="100000"/>
-              <a:buFont typeface="Times New Roman"/>
-              <a:buChar char="•"/>
-            </a:pPr>
-            <a:r>
-              <a:rPr lang="en-US" sz="3600" b="1" dirty="0">
-                <a:solidFill>
-                  <a:srgbClr val="292934"/>
-                </a:solidFill>
-                <a:latin typeface="Times New Roman"/>
-                <a:ea typeface="Times New Roman"/>
-                <a:cs typeface="Times New Roman"/>
-                <a:sym typeface="Times New Roman"/>
-              </a:rPr>
-              <a:t>Conclusion </a:t>
-            </a:r>
-            <a:endParaRPr sz="3600" b="1" dirty="0">
-              <a:solidFill>
-                <a:srgbClr val="292934"/>
-              </a:solidFill>
-              <a:latin typeface="Times New Roman"/>
-              <a:ea typeface="Times New Roman"/>
-              <a:cs typeface="Times New Roman"/>
-              <a:sym typeface="Times New Roman"/>
-            </a:endParaRPr>
-          </a:p>
-          <a:p>
-            <a:pPr marL="342900" lvl="0" indent="-253206" algn="l" rtl="0">
-              <a:lnSpc>
-                <a:spcPct val="150000"/>
-              </a:lnSpc>
-              <a:spcBef>
-                <a:spcPts val="0"/>
-              </a:spcBef>
-              <a:spcAft>
-                <a:spcPts val="0"/>
-              </a:spcAft>
-              <a:buClr>
-                <a:srgbClr val="292934"/>
-              </a:buClr>
-              <a:buSzPct val="100000"/>
-              <a:buFont typeface="Times New Roman"/>
-              <a:buChar char="•"/>
-            </a:pPr>
-            <a:r>
-              <a:rPr lang="en-US" sz="3600" b="1" dirty="0">
-                <a:solidFill>
-                  <a:srgbClr val="292934"/>
-                </a:solidFill>
-                <a:latin typeface="Times New Roman"/>
-                <a:ea typeface="Times New Roman"/>
-                <a:cs typeface="Times New Roman"/>
-                <a:sym typeface="Times New Roman"/>
-              </a:rPr>
-              <a:t>Future Scope</a:t>
-            </a:r>
-            <a:endParaRPr sz="3600" b="1" dirty="0">
-              <a:solidFill>
-                <a:srgbClr val="292934"/>
-              </a:solidFill>
-              <a:latin typeface="Times New Roman"/>
-              <a:ea typeface="Times New Roman"/>
-              <a:cs typeface="Times New Roman"/>
-              <a:sym typeface="Times New Roman"/>
-            </a:endParaRPr>
-          </a:p>
-          <a:p>
-            <a:pPr marL="0" lvl="0" indent="0" algn="l" rtl="0">
-              <a:lnSpc>
-                <a:spcPct val="100000"/>
-              </a:lnSpc>
-              <a:spcBef>
-                <a:spcPts val="0"/>
-              </a:spcBef>
-              <a:spcAft>
-                <a:spcPts val="0"/>
-              </a:spcAft>
-              <a:buClr>
-                <a:schemeClr val="dk1"/>
-              </a:buClr>
-              <a:buFont typeface="Arial"/>
-              <a:buNone/>
-            </a:pPr>
-            <a:endParaRPr sz="1800" dirty="0">
-              <a:solidFill>
-                <a:srgbClr val="292934"/>
-              </a:solidFill>
-              <a:latin typeface="Arial"/>
-              <a:ea typeface="Arial"/>
-              <a:cs typeface="Arial"/>
-              <a:sym typeface="Arial"/>
-            </a:endParaRPr>
-          </a:p>
-          <a:p>
-            <a:pPr marL="228600" lvl="0" indent="-86360" algn="l" rtl="0">
-              <a:lnSpc>
-                <a:spcPct val="100000"/>
-              </a:lnSpc>
-              <a:spcBef>
-                <a:spcPts val="1000"/>
-              </a:spcBef>
-              <a:spcAft>
-                <a:spcPts val="0"/>
-              </a:spcAft>
-              <a:buClr>
-                <a:schemeClr val="dk1"/>
-              </a:buClr>
-              <a:buSzPct val="100000"/>
-              <a:buNone/>
-            </a:pPr>
-            <a:endParaRPr dirty="0">
-              <a:latin typeface="Times New Roman"/>
-              <a:ea typeface="Times New Roman"/>
-              <a:cs typeface="Times New Roman"/>
-              <a:sym typeface="Times New Roman"/>
-            </a:endParaRPr>
-          </a:p>
-        </p:txBody>
-      </p:sp>
-      <p:sp>
-        <p:nvSpPr>
-          <p:cNvPr id="97" name="Google Shape;97;p14"/>
-          <p:cNvSpPr/>
-          <p:nvPr/>
-        </p:nvSpPr>
-        <p:spPr>
-          <a:xfrm>
-            <a:off x="14605" y="-5080"/>
-            <a:ext cx="7230000" cy="1003800"/>
-          </a:xfrm>
-          <a:prstGeom prst="homePlate">
-            <a:avLst>
-              <a:gd name="adj" fmla="val 50000"/>
-            </a:avLst>
-          </a:prstGeom>
-          <a:gradFill>
-            <a:gsLst>
-              <a:gs pos="0">
-                <a:srgbClr val="E30000"/>
-              </a:gs>
-              <a:gs pos="100000">
-                <a:srgbClr val="760303"/>
-              </a:gs>
-            </a:gsLst>
-            <a:lin ang="0" scaled="0"/>
-          </a:gradFill>
-          <a:ln w="12700" cap="flat" cmpd="sng">
-            <a:solidFill>
-              <a:srgbClr val="42719B"/>
-            </a:solidFill>
-            <a:prstDash val="solid"/>
-            <a:miter lim="800000"/>
-            <a:headEnd type="none" w="sm" len="sm"/>
-            <a:tailEnd type="none" w="sm" len="sm"/>
-          </a:ln>
-        </p:spPr>
-        <p:txBody>
-          <a:bodyPr spcFirstLastPara="1" wrap="square" lIns="91425" tIns="45700" rIns="91425" bIns="45700" anchor="ctr" anchorCtr="0">
-            <a:noAutofit/>
-          </a:bodyPr>
-          <a:lstStyle/>
-          <a:p>
-            <a:pPr marL="0" marR="0" lvl="0" indent="0" algn="ctr" rtl="0">
-              <a:spcBef>
-                <a:spcPts val="0"/>
-              </a:spcBef>
-              <a:spcAft>
-                <a:spcPts val="0"/>
-              </a:spcAft>
-              <a:buNone/>
-            </a:pPr>
-            <a:endParaRPr sz="1800" b="0" i="0" u="none" strike="noStrike" cap="none">
-              <a:solidFill>
-                <a:schemeClr val="lt1"/>
-              </a:solidFill>
-              <a:highlight>
-                <a:srgbClr val="FF0000"/>
-              </a:highlight>
-              <a:latin typeface="Calibri"/>
-              <a:ea typeface="Calibri"/>
-              <a:cs typeface="Calibri"/>
-              <a:sym typeface="Calibri"/>
-            </a:endParaRPr>
-          </a:p>
-        </p:txBody>
-      </p:sp>
-      <p:sp>
-        <p:nvSpPr>
-          <p:cNvPr id="98" name="Google Shape;98;p14"/>
-          <p:cNvSpPr/>
-          <p:nvPr/>
-        </p:nvSpPr>
-        <p:spPr>
-          <a:xfrm>
-            <a:off x="232410" y="107950"/>
-            <a:ext cx="7707600" cy="891600"/>
-          </a:xfrm>
-          <a:prstGeom prst="rect">
-            <a:avLst/>
-          </a:prstGeom>
-          <a:noFill/>
-          <a:ln>
-            <a:noFill/>
-          </a:ln>
-        </p:spPr>
-        <p:txBody>
-          <a:bodyPr spcFirstLastPara="1" wrap="square" lIns="91425" tIns="45700" rIns="91425" bIns="45700" anchor="ctr" anchorCtr="0">
-            <a:noAutofit/>
-          </a:bodyPr>
-          <a:lstStyle/>
-          <a:p>
-            <a:pPr marL="0" marR="0" lvl="0" indent="0" algn="l" rtl="0">
-              <a:lnSpc>
-                <a:spcPct val="90000"/>
-              </a:lnSpc>
-              <a:spcBef>
-                <a:spcPts val="0"/>
-              </a:spcBef>
-              <a:spcAft>
-                <a:spcPts val="0"/>
-              </a:spcAft>
-              <a:buClr>
-                <a:schemeClr val="lt1"/>
-              </a:buClr>
-              <a:buSzPts val="4000"/>
-              <a:buFont typeface="Times New Roman"/>
-              <a:buNone/>
-            </a:pPr>
-            <a:r>
-              <a:rPr lang="en-US" sz="4000" b="1">
-                <a:solidFill>
-                  <a:schemeClr val="lt1"/>
-                </a:solidFill>
-                <a:latin typeface="Times New Roman"/>
-                <a:ea typeface="Times New Roman"/>
-                <a:cs typeface="Times New Roman"/>
-                <a:sym typeface="Times New Roman"/>
-              </a:rPr>
-              <a:t>Contents of the Presentation</a:t>
-            </a:r>
-            <a:endParaRPr sz="3200" b="1" i="0" u="none" strike="noStrike" cap="none">
-              <a:solidFill>
-                <a:schemeClr val="lt1"/>
-              </a:solidFill>
-              <a:latin typeface="Times New Roman"/>
-              <a:ea typeface="Times New Roman"/>
-              <a:cs typeface="Times New Roman"/>
-              <a:sym typeface="Times New Roman"/>
-            </a:endParaRPr>
           </a:p>
         </p:txBody>
       </p:sp>

</xml_diff>